<commit_message>
Added: loops to presentation
</commit_message>
<xml_diff>
--- a/CrashCourse_JAVA.pptx
+++ b/CrashCourse_JAVA.pptx
@@ -5,7 +5,7 @@
     <p:sldMasterId id="2147483648" r:id="rId1"/>
   </p:sldMasterIdLst>
   <p:notesMasterIdLst>
-    <p:notesMasterId r:id="rId19"/>
+    <p:notesMasterId r:id="rId21"/>
   </p:notesMasterIdLst>
   <p:sldIdLst>
     <p:sldId id="256" r:id="rId2"/>
@@ -14,17 +14,19 @@
     <p:sldId id="259" r:id="rId5"/>
     <p:sldId id="260" r:id="rId6"/>
     <p:sldId id="261" r:id="rId7"/>
-    <p:sldId id="262" r:id="rId8"/>
-    <p:sldId id="263" r:id="rId9"/>
-    <p:sldId id="264" r:id="rId10"/>
-    <p:sldId id="265" r:id="rId11"/>
-    <p:sldId id="266" r:id="rId12"/>
-    <p:sldId id="267" r:id="rId13"/>
-    <p:sldId id="268" r:id="rId14"/>
-    <p:sldId id="269" r:id="rId15"/>
-    <p:sldId id="272" r:id="rId16"/>
-    <p:sldId id="271" r:id="rId17"/>
-    <p:sldId id="270" r:id="rId18"/>
+    <p:sldId id="273" r:id="rId8"/>
+    <p:sldId id="274" r:id="rId9"/>
+    <p:sldId id="262" r:id="rId10"/>
+    <p:sldId id="263" r:id="rId11"/>
+    <p:sldId id="264" r:id="rId12"/>
+    <p:sldId id="265" r:id="rId13"/>
+    <p:sldId id="266" r:id="rId14"/>
+    <p:sldId id="267" r:id="rId15"/>
+    <p:sldId id="268" r:id="rId16"/>
+    <p:sldId id="269" r:id="rId17"/>
+    <p:sldId id="272" r:id="rId18"/>
+    <p:sldId id="271" r:id="rId19"/>
+    <p:sldId id="270" r:id="rId20"/>
   </p:sldIdLst>
   <p:sldSz cx="12192000" cy="6858000"/>
   <p:notesSz cx="6858000" cy="9144000"/>
@@ -213,7 +215,7 @@
           <a:p>
             <a:fld id="{5D31C5D4-4125-43B4-BA70-DAFFA7345809}" type="datetimeFigureOut">
               <a:rPr lang="de-DE" smtClean="0"/>
-              <a:t>21.10.2019</a:t>
+              <a:t>22.10.2019</a:t>
             </a:fld>
             <a:endParaRPr lang="de-DE"/>
           </a:p>
@@ -762,7 +764,7 @@
           <a:p>
             <a:fld id="{82A199A8-DE3D-4317-A542-09937217C4E9}" type="datetimeFigureOut">
               <a:rPr lang="de-DE" smtClean="0"/>
-              <a:t>21.10.2019</a:t>
+              <a:t>22.10.2019</a:t>
             </a:fld>
             <a:endParaRPr lang="de-DE"/>
           </a:p>
@@ -962,7 +964,7 @@
           <a:p>
             <a:fld id="{82A199A8-DE3D-4317-A542-09937217C4E9}" type="datetimeFigureOut">
               <a:rPr lang="de-DE" smtClean="0"/>
-              <a:t>21.10.2019</a:t>
+              <a:t>22.10.2019</a:t>
             </a:fld>
             <a:endParaRPr lang="de-DE"/>
           </a:p>
@@ -1172,7 +1174,7 @@
           <a:p>
             <a:fld id="{82A199A8-DE3D-4317-A542-09937217C4E9}" type="datetimeFigureOut">
               <a:rPr lang="de-DE" smtClean="0"/>
-              <a:t>21.10.2019</a:t>
+              <a:t>22.10.2019</a:t>
             </a:fld>
             <a:endParaRPr lang="de-DE"/>
           </a:p>
@@ -1372,7 +1374,7 @@
           <a:p>
             <a:fld id="{82A199A8-DE3D-4317-A542-09937217C4E9}" type="datetimeFigureOut">
               <a:rPr lang="de-DE" smtClean="0"/>
-              <a:t>21.10.2019</a:t>
+              <a:t>22.10.2019</a:t>
             </a:fld>
             <a:endParaRPr lang="de-DE"/>
           </a:p>
@@ -1648,7 +1650,7 @@
           <a:p>
             <a:fld id="{82A199A8-DE3D-4317-A542-09937217C4E9}" type="datetimeFigureOut">
               <a:rPr lang="de-DE" smtClean="0"/>
-              <a:t>21.10.2019</a:t>
+              <a:t>22.10.2019</a:t>
             </a:fld>
             <a:endParaRPr lang="de-DE"/>
           </a:p>
@@ -1916,7 +1918,7 @@
           <a:p>
             <a:fld id="{82A199A8-DE3D-4317-A542-09937217C4E9}" type="datetimeFigureOut">
               <a:rPr lang="de-DE" smtClean="0"/>
-              <a:t>21.10.2019</a:t>
+              <a:t>22.10.2019</a:t>
             </a:fld>
             <a:endParaRPr lang="de-DE"/>
           </a:p>
@@ -2331,7 +2333,7 @@
           <a:p>
             <a:fld id="{82A199A8-DE3D-4317-A542-09937217C4E9}" type="datetimeFigureOut">
               <a:rPr lang="de-DE" smtClean="0"/>
-              <a:t>21.10.2019</a:t>
+              <a:t>22.10.2019</a:t>
             </a:fld>
             <a:endParaRPr lang="de-DE"/>
           </a:p>
@@ -2473,7 +2475,7 @@
           <a:p>
             <a:fld id="{82A199A8-DE3D-4317-A542-09937217C4E9}" type="datetimeFigureOut">
               <a:rPr lang="de-DE" smtClean="0"/>
-              <a:t>21.10.2019</a:t>
+              <a:t>22.10.2019</a:t>
             </a:fld>
             <a:endParaRPr lang="de-DE"/>
           </a:p>
@@ -2586,7 +2588,7 @@
           <a:p>
             <a:fld id="{82A199A8-DE3D-4317-A542-09937217C4E9}" type="datetimeFigureOut">
               <a:rPr lang="de-DE" smtClean="0"/>
-              <a:t>21.10.2019</a:t>
+              <a:t>22.10.2019</a:t>
             </a:fld>
             <a:endParaRPr lang="de-DE"/>
           </a:p>
@@ -2899,7 +2901,7 @@
           <a:p>
             <a:fld id="{82A199A8-DE3D-4317-A542-09937217C4E9}" type="datetimeFigureOut">
               <a:rPr lang="de-DE" smtClean="0"/>
-              <a:t>21.10.2019</a:t>
+              <a:t>22.10.2019</a:t>
             </a:fld>
             <a:endParaRPr lang="de-DE"/>
           </a:p>
@@ -3188,7 +3190,7 @@
           <a:p>
             <a:fld id="{82A199A8-DE3D-4317-A542-09937217C4E9}" type="datetimeFigureOut">
               <a:rPr lang="de-DE" smtClean="0"/>
-              <a:t>21.10.2019</a:t>
+              <a:t>22.10.2019</a:t>
             </a:fld>
             <a:endParaRPr lang="de-DE"/>
           </a:p>
@@ -3431,7 +3433,7 @@
           <a:p>
             <a:fld id="{82A199A8-DE3D-4317-A542-09937217C4E9}" type="datetimeFigureOut">
               <a:rPr lang="de-DE" smtClean="0"/>
-              <a:t>21.10.2019</a:t>
+              <a:t>22.10.2019</a:t>
             </a:fld>
             <a:endParaRPr lang="de-DE"/>
           </a:p>
@@ -3945,7 +3947,7 @@
           <p:cNvPr id="2" name="Title 1">
             <a:extLst>
               <a:ext uri="{FF2B5EF4-FFF2-40B4-BE49-F238E27FC236}">
-                <a16:creationId xmlns:a16="http://schemas.microsoft.com/office/drawing/2014/main" id="{60B72FCD-8E2F-46F9-92E2-FDD57723B629}"/>
+                <a16:creationId xmlns:a16="http://schemas.microsoft.com/office/drawing/2014/main" id="{AC035A81-84C6-414C-99DA-0F3DCDD4BA8E}"/>
               </a:ext>
             </a:extLst>
           </p:cNvPr>
@@ -3962,74 +3964,137 @@
           <a:lstStyle/>
           <a:p>
             <a:r>
+              <a:rPr lang="en-US" dirty="0"/>
+              <a:t>Klassen-/</a:t>
+            </a:r>
+            <a:r>
               <a:rPr lang="en-US" dirty="0" err="1"/>
-              <a:t>Beispiel</a:t>
+              <a:t>Objekt-Orientierung</a:t>
             </a:r>
             <a:r>
               <a:rPr lang="en-US" dirty="0"/>
-              <a:t>: Engine-</a:t>
-            </a:r>
+              <a:t> - Klassen</a:t>
+            </a:r>
+            <a:endParaRPr lang="de-DE" dirty="0"/>
+          </a:p>
+        </p:txBody>
+      </p:sp>
+      <p:sp>
+        <p:nvSpPr>
+          <p:cNvPr id="3" name="Content Placeholder 2">
+            <a:extLst>
+              <a:ext uri="{FF2B5EF4-FFF2-40B4-BE49-F238E27FC236}">
+                <a16:creationId xmlns:a16="http://schemas.microsoft.com/office/drawing/2014/main" id="{95D03560-AD46-4CA0-A465-3B29CC79B2DA}"/>
+              </a:ext>
+            </a:extLst>
+          </p:cNvPr>
+          <p:cNvSpPr>
+            <a:spLocks noGrp="1"/>
+          </p:cNvSpPr>
+          <p:nvPr>
+            <p:ph idx="1"/>
+          </p:nvPr>
+        </p:nvSpPr>
+        <p:spPr/>
+        <p:txBody>
+          <a:bodyPr/>
+          <a:lstStyle/>
+          <a:p>
             <a:r>
               <a:rPr lang="en-US" dirty="0" err="1"/>
-              <a:t>Klasse</a:t>
-            </a:r>
-            <a:endParaRPr lang="de-DE" dirty="0"/>
-          </a:p>
-        </p:txBody>
-      </p:sp>
-      <p:sp>
-        <p:nvSpPr>
-          <p:cNvPr id="3" name="Content Placeholder 2">
-            <a:extLst>
-              <a:ext uri="{FF2B5EF4-FFF2-40B4-BE49-F238E27FC236}">
-                <a16:creationId xmlns:a16="http://schemas.microsoft.com/office/drawing/2014/main" id="{F70FB673-C264-47C1-9790-750438145FB7}"/>
-              </a:ext>
-            </a:extLst>
-          </p:cNvPr>
-          <p:cNvSpPr>
-            <a:spLocks noGrp="1"/>
-          </p:cNvSpPr>
-          <p:nvPr>
-            <p:ph idx="1"/>
-          </p:nvPr>
-        </p:nvSpPr>
-        <p:spPr>
-          <a:xfrm>
-            <a:off x="838200" y="1825624"/>
-            <a:ext cx="10515600" cy="5032375"/>
-          </a:xfrm>
-        </p:spPr>
-        <p:txBody>
-          <a:bodyPr>
-            <a:normAutofit fontScale="92500" lnSpcReduction="20000"/>
-          </a:bodyPr>
-          <a:lstStyle/>
-          <a:p>
-            <a:pPr marL="0" indent="0">
-              <a:buNone/>
-            </a:pPr>
+              <a:t>Kapseln</a:t>
+            </a:r>
+            <a:r>
+              <a:rPr lang="en-US" dirty="0"/>
+              <a:t> </a:t>
+            </a:r>
+            <a:r>
+              <a:rPr lang="en-US" dirty="0" err="1"/>
+              <a:t>Logik</a:t>
+            </a:r>
+            <a:endParaRPr lang="en-US" dirty="0"/>
+          </a:p>
+          <a:p>
+            <a:r>
+              <a:rPr lang="en-US" dirty="0" err="1"/>
+              <a:t>Bestehen</a:t>
+            </a:r>
+            <a:r>
+              <a:rPr lang="en-US" dirty="0"/>
+              <a:t> </a:t>
+            </a:r>
+            <a:r>
+              <a:rPr lang="en-US" dirty="0" err="1"/>
+              <a:t>aus</a:t>
+            </a:r>
+            <a:r>
+              <a:rPr lang="en-US" dirty="0"/>
+              <a:t> </a:t>
+            </a:r>
+            <a:r>
+              <a:rPr lang="en-US" dirty="0" err="1"/>
+              <a:t>Eigenschaften</a:t>
+            </a:r>
+            <a:r>
+              <a:rPr lang="en-US" dirty="0"/>
+              <a:t> (Attribute) und </a:t>
+            </a:r>
+            <a:r>
+              <a:rPr lang="en-US" dirty="0" err="1"/>
+              <a:t>Fähigkeiten</a:t>
+            </a:r>
+            <a:r>
+              <a:rPr lang="en-US" dirty="0"/>
+              <a:t> (</a:t>
+            </a:r>
+            <a:r>
+              <a:rPr lang="en-US" dirty="0" err="1"/>
+              <a:t>Methoden</a:t>
+            </a:r>
+            <a:r>
+              <a:rPr lang="en-US" dirty="0"/>
+              <a:t>)</a:t>
+            </a:r>
+          </a:p>
+          <a:p>
+            <a:pPr lvl="1"/>
+            <a:r>
+              <a:rPr lang="en-US" dirty="0"/>
+              <a:t>Pro </a:t>
+            </a:r>
+            <a:r>
+              <a:rPr lang="en-US" dirty="0" err="1"/>
+              <a:t>Objekt</a:t>
+            </a:r>
+            <a:r>
+              <a:rPr lang="en-US" dirty="0"/>
+              <a:t> </a:t>
+            </a:r>
+            <a:r>
+              <a:rPr lang="en-US" dirty="0" err="1"/>
+              <a:t>oder</a:t>
+            </a:r>
+            <a:endParaRPr lang="en-US" dirty="0"/>
+          </a:p>
+          <a:p>
+            <a:pPr lvl="1"/>
+            <a:r>
+              <a:rPr lang="en-US" dirty="0" err="1"/>
+              <a:t>Klassenübergreifend</a:t>
+            </a:r>
+            <a:r>
+              <a:rPr lang="en-US" dirty="0"/>
+              <a:t>: </a:t>
+            </a:r>
             <a:r>
               <a:rPr lang="en-US" dirty="0">
                 <a:latin typeface="Consolas" panose="020B0609020204030204" pitchFamily="49" charset="0"/>
               </a:rPr>
-              <a:t>public class Engine {</a:t>
-            </a:r>
-          </a:p>
-          <a:p>
-            <a:pPr marL="0" indent="0">
-              <a:buNone/>
-            </a:pPr>
-            <a:r>
-              <a:rPr lang="en-US" dirty="0">
-                <a:latin typeface="Consolas" panose="020B0609020204030204" pitchFamily="49" charset="0"/>
-              </a:rPr>
-              <a:t>	private Integer horsepower;</a:t>
-            </a:r>
-          </a:p>
-          <a:p>
-            <a:pPr marL="0" indent="0">
-              <a:buNone/>
-            </a:pPr>
+              <a:t>static</a:t>
+            </a:r>
+          </a:p>
+          <a:p>
+            <a:pPr lvl="1"/>
             <a:endParaRPr lang="en-US" dirty="0">
               <a:latin typeface="Consolas" panose="020B0609020204030204" pitchFamily="49" charset="0"/>
             </a:endParaRPr>
@@ -4042,7 +4107,7 @@
               <a:rPr lang="en-US" dirty="0">
                 <a:latin typeface="Consolas" panose="020B0609020204030204" pitchFamily="49" charset="0"/>
               </a:rPr>
-              <a:t>	public Engine(Integer horsepower){</a:t>
+              <a:t>public class Engine {</a:t>
             </a:r>
           </a:p>
           <a:p>
@@ -4053,19 +4118,43 @@
               <a:rPr lang="en-US" dirty="0">
                 <a:latin typeface="Consolas" panose="020B0609020204030204" pitchFamily="49" charset="0"/>
               </a:rPr>
-              <a:t>		</a:t>
+              <a:t>	// </a:t>
             </a:r>
             <a:r>
               <a:rPr lang="en-US" dirty="0" err="1">
                 <a:latin typeface="Consolas" panose="020B0609020204030204" pitchFamily="49" charset="0"/>
               </a:rPr>
-              <a:t>this.horsepower</a:t>
+              <a:t>Hier</a:t>
             </a:r>
             <a:r>
               <a:rPr lang="en-US" dirty="0">
                 <a:latin typeface="Consolas" panose="020B0609020204030204" pitchFamily="49" charset="0"/>
               </a:rPr>
-              <a:t> = horsepower;</a:t>
+              <a:t> </a:t>
+            </a:r>
+            <a:r>
+              <a:rPr lang="en-US" dirty="0" err="1">
+                <a:latin typeface="Consolas" panose="020B0609020204030204" pitchFamily="49" charset="0"/>
+              </a:rPr>
+              <a:t>kommt</a:t>
+            </a:r>
+            <a:r>
+              <a:rPr lang="en-US" dirty="0">
+                <a:latin typeface="Consolas" panose="020B0609020204030204" pitchFamily="49" charset="0"/>
+              </a:rPr>
+              <a:t> die </a:t>
+            </a:r>
+            <a:r>
+              <a:rPr lang="en-US" dirty="0" err="1">
+                <a:latin typeface="Consolas" panose="020B0609020204030204" pitchFamily="49" charset="0"/>
+              </a:rPr>
+              <a:t>Logik</a:t>
+            </a:r>
+            <a:r>
+              <a:rPr lang="en-US" dirty="0">
+                <a:latin typeface="Consolas" panose="020B0609020204030204" pitchFamily="49" charset="0"/>
+              </a:rPr>
+              <a:t> rein</a:t>
             </a:r>
           </a:p>
           <a:p>
@@ -4076,105 +4165,15 @@
               <a:rPr lang="en-US" dirty="0">
                 <a:latin typeface="Consolas" panose="020B0609020204030204" pitchFamily="49" charset="0"/>
               </a:rPr>
-              <a:t>	}</a:t>
-            </a:r>
-          </a:p>
-          <a:p>
-            <a:pPr marL="0" indent="0">
-              <a:buNone/>
-            </a:pPr>
-            <a:r>
-              <a:rPr lang="en-US" dirty="0">
-                <a:latin typeface="Consolas" panose="020B0609020204030204" pitchFamily="49" charset="0"/>
-              </a:rPr>
-              <a:t>	</a:t>
-            </a:r>
-          </a:p>
-          <a:p>
-            <a:pPr marL="0" indent="0">
-              <a:buNone/>
-            </a:pPr>
-            <a:r>
-              <a:rPr lang="en-US" dirty="0">
-                <a:latin typeface="Consolas" panose="020B0609020204030204" pitchFamily="49" charset="0"/>
-              </a:rPr>
-              <a:t>	public Integer </a:t>
-            </a:r>
-            <a:r>
-              <a:rPr lang="en-US" dirty="0" err="1">
-                <a:latin typeface="Consolas" panose="020B0609020204030204" pitchFamily="49" charset="0"/>
-              </a:rPr>
-              <a:t>calculateMileage</a:t>
-            </a:r>
-            <a:r>
-              <a:rPr lang="en-US" dirty="0">
-                <a:latin typeface="Consolas" panose="020B0609020204030204" pitchFamily="49" charset="0"/>
-              </a:rPr>
-              <a:t>(Integer rpm){</a:t>
-            </a:r>
-          </a:p>
-          <a:p>
-            <a:pPr marL="0" indent="0">
-              <a:buNone/>
-            </a:pPr>
-            <a:r>
-              <a:rPr lang="en-US" dirty="0">
-                <a:latin typeface="Consolas" panose="020B0609020204030204" pitchFamily="49" charset="0"/>
-              </a:rPr>
-              <a:t>		return (</a:t>
-            </a:r>
-            <a:r>
-              <a:rPr lang="en-US" dirty="0" err="1">
-                <a:latin typeface="Consolas" panose="020B0609020204030204" pitchFamily="49" charset="0"/>
-              </a:rPr>
-              <a:t>this.horsepower</a:t>
-            </a:r>
-            <a:r>
-              <a:rPr lang="en-US" dirty="0">
-                <a:latin typeface="Consolas" panose="020B0609020204030204" pitchFamily="49" charset="0"/>
-              </a:rPr>
-              <a:t>/100) * (rpm/1000);</a:t>
-            </a:r>
-          </a:p>
-          <a:p>
-            <a:pPr marL="0" indent="0">
-              <a:buNone/>
-            </a:pPr>
-            <a:r>
-              <a:rPr lang="en-US" dirty="0">
-                <a:latin typeface="Consolas" panose="020B0609020204030204" pitchFamily="49" charset="0"/>
-              </a:rPr>
-              <a:t>	}</a:t>
-            </a:r>
-          </a:p>
-          <a:p>
-            <a:pPr marL="0" indent="0">
-              <a:buNone/>
-            </a:pPr>
-            <a:endParaRPr lang="en-US" dirty="0">
-              <a:latin typeface="Consolas" panose="020B0609020204030204" pitchFamily="49" charset="0"/>
-            </a:endParaRPr>
-          </a:p>
-          <a:p>
-            <a:pPr marL="0" indent="0">
-              <a:buNone/>
-            </a:pPr>
-            <a:r>
-              <a:rPr lang="en-US" dirty="0">
-                <a:latin typeface="Consolas" panose="020B0609020204030204" pitchFamily="49" charset="0"/>
-              </a:rPr>
               <a:t>}</a:t>
             </a:r>
-          </a:p>
-          <a:p>
-            <a:endParaRPr lang="de-DE" dirty="0"/>
           </a:p>
         </p:txBody>
       </p:sp>
     </p:spTree>
     <p:extLst>
       <p:ext uri="{BB962C8B-B14F-4D97-AF65-F5344CB8AC3E}">
-        <p14:creationId xmlns:p14="http://schemas.microsoft.com/office/powerpoint/2010/main" val="3110209038"/>
+        <p14:creationId xmlns:p14="http://schemas.microsoft.com/office/powerpoint/2010/main" val="2573320119"/>
       </p:ext>
     </p:extLst>
   </p:cSld>
@@ -4206,7 +4205,7 @@
           <p:cNvPr id="2" name="Title 1">
             <a:extLst>
               <a:ext uri="{FF2B5EF4-FFF2-40B4-BE49-F238E27FC236}">
-                <a16:creationId xmlns:a16="http://schemas.microsoft.com/office/drawing/2014/main" id="{534D15F0-276C-4F0C-BFE8-15E5400839A6}"/>
+                <a16:creationId xmlns:a16="http://schemas.microsoft.com/office/drawing/2014/main" id="{B0FA0676-DDB8-4556-B859-A111634CC550}"/>
               </a:ext>
             </a:extLst>
           </p:cNvPr>
@@ -4223,8 +4222,24 @@
           <a:lstStyle/>
           <a:p>
             <a:r>
+              <a:rPr lang="en-US" dirty="0"/>
+              <a:t>Klassen-/</a:t>
+            </a:r>
+            <a:r>
               <a:rPr lang="en-US" dirty="0" err="1"/>
-              <a:t>Vererbung</a:t>
+              <a:t>Objekt-Orientierung</a:t>
+            </a:r>
+            <a:r>
+              <a:rPr lang="en-US" dirty="0"/>
+              <a:t> – </a:t>
+            </a:r>
+            <a:r>
+              <a:rPr lang="en-US" dirty="0" err="1"/>
+              <a:t>Methoden</a:t>
+            </a:r>
+            <a:r>
+              <a:rPr lang="en-US" dirty="0"/>
+              <a:t>/Attribute</a:t>
             </a:r>
             <a:endParaRPr lang="de-DE" dirty="0"/>
           </a:p>
@@ -4235,7 +4250,7 @@
           <p:cNvPr id="3" name="Content Placeholder 2">
             <a:extLst>
               <a:ext uri="{FF2B5EF4-FFF2-40B4-BE49-F238E27FC236}">
-                <a16:creationId xmlns:a16="http://schemas.microsoft.com/office/drawing/2014/main" id="{632BDF9C-048E-4C94-BB9D-D9E0A04A8EFF}"/>
+                <a16:creationId xmlns:a16="http://schemas.microsoft.com/office/drawing/2014/main" id="{559D652A-7F33-47E7-AA1C-1DEAF90A72AE}"/>
               </a:ext>
             </a:extLst>
           </p:cNvPr>
@@ -4248,46 +4263,180 @@
         </p:nvSpPr>
         <p:spPr/>
         <p:txBody>
-          <a:bodyPr/>
-          <a:lstStyle/>
-          <a:p>
+          <a:bodyPr>
+            <a:normAutofit fontScale="92500" lnSpcReduction="20000"/>
+          </a:bodyPr>
+          <a:lstStyle/>
+          <a:p>
+            <a:pPr marL="0" indent="0">
+              <a:buNone/>
+            </a:pPr>
             <a:r>
               <a:rPr lang="en-US" dirty="0"/>
-              <a:t>Klassen </a:t>
-            </a:r>
+              <a:t>Attribute</a:t>
+            </a:r>
+          </a:p>
+          <a:p>
+            <a:pPr marL="0" indent="0">
+              <a:buNone/>
+            </a:pPr>
+            <a:r>
+              <a:rPr lang="en-US" dirty="0" err="1">
+                <a:latin typeface="Consolas" panose="020B0609020204030204" pitchFamily="49" charset="0"/>
+              </a:rPr>
+              <a:t>sichtbarkeit</a:t>
+            </a:r>
+            <a:r>
+              <a:rPr lang="en-US" dirty="0">
+                <a:latin typeface="Consolas" panose="020B0609020204030204" pitchFamily="49" charset="0"/>
+              </a:rPr>
+              <a:t> (static) </a:t>
+            </a:r>
+            <a:r>
+              <a:rPr lang="en-US" dirty="0" err="1">
+                <a:latin typeface="Consolas" panose="020B0609020204030204" pitchFamily="49" charset="0"/>
+              </a:rPr>
+              <a:t>Typ</a:t>
+            </a:r>
+            <a:r>
+              <a:rPr lang="en-US" dirty="0">
+                <a:latin typeface="Consolas" panose="020B0609020204030204" pitchFamily="49" charset="0"/>
+              </a:rPr>
+              <a:t> Name;</a:t>
+            </a:r>
+            <a:br>
+              <a:rPr lang="en-US" dirty="0">
+                <a:latin typeface="Consolas" panose="020B0609020204030204" pitchFamily="49" charset="0"/>
+              </a:rPr>
+            </a:br>
+            <a:r>
+              <a:rPr lang="en-US" dirty="0">
+                <a:latin typeface="Consolas" panose="020B0609020204030204" pitchFamily="49" charset="0"/>
+              </a:rPr>
+              <a:t>private Integer horsepower; </a:t>
+            </a:r>
+          </a:p>
+          <a:p>
+            <a:pPr marL="0" indent="0">
+              <a:buNone/>
+            </a:pPr>
+            <a:endParaRPr lang="en-US" dirty="0">
+              <a:latin typeface="Consolas" panose="020B0609020204030204" pitchFamily="49" charset="0"/>
+            </a:endParaRPr>
+          </a:p>
+          <a:p>
+            <a:pPr marL="0" indent="0">
+              <a:buNone/>
+            </a:pPr>
             <a:r>
               <a:rPr lang="en-US" dirty="0" err="1"/>
-              <a:t>können</a:t>
-            </a:r>
+              <a:t>Methoden</a:t>
+            </a:r>
+            <a:endParaRPr lang="en-US" dirty="0"/>
+          </a:p>
+          <a:p>
+            <a:pPr marL="0" indent="0">
+              <a:buNone/>
+            </a:pPr>
+            <a:r>
+              <a:rPr lang="en-US" dirty="0" err="1">
+                <a:latin typeface="Consolas" panose="020B0609020204030204" pitchFamily="49" charset="0"/>
+              </a:rPr>
+              <a:t>sichtbarkeit</a:t>
+            </a:r>
+            <a:r>
+              <a:rPr lang="en-US" dirty="0">
+                <a:latin typeface="Consolas" panose="020B0609020204030204" pitchFamily="49" charset="0"/>
+              </a:rPr>
+              <a:t> (static) </a:t>
+            </a:r>
+            <a:r>
+              <a:rPr lang="en-US" dirty="0" err="1">
+                <a:latin typeface="Consolas" panose="020B0609020204030204" pitchFamily="49" charset="0"/>
+              </a:rPr>
+              <a:t>Rückgabe-Typ</a:t>
+            </a:r>
+            <a:r>
+              <a:rPr lang="en-US" dirty="0">
+                <a:latin typeface="Consolas" panose="020B0609020204030204" pitchFamily="49" charset="0"/>
+              </a:rPr>
+              <a:t> Name(</a:t>
+            </a:r>
+            <a:r>
+              <a:rPr lang="en-US" dirty="0" err="1">
+                <a:latin typeface="Consolas" panose="020B0609020204030204" pitchFamily="49" charset="0"/>
+              </a:rPr>
+              <a:t>Parametertype</a:t>
+            </a:r>
+            <a:r>
+              <a:rPr lang="en-US" dirty="0">
+                <a:latin typeface="Consolas" panose="020B0609020204030204" pitchFamily="49" charset="0"/>
+              </a:rPr>
+              <a:t> </a:t>
+            </a:r>
+            <a:r>
+              <a:rPr lang="en-US" dirty="0" err="1">
+                <a:latin typeface="Consolas" panose="020B0609020204030204" pitchFamily="49" charset="0"/>
+              </a:rPr>
+              <a:t>parameterName</a:t>
+            </a:r>
+            <a:r>
+              <a:rPr lang="en-US" dirty="0">
+                <a:latin typeface="Consolas" panose="020B0609020204030204" pitchFamily="49" charset="0"/>
+              </a:rPr>
+              <a:t>){</a:t>
+            </a:r>
+          </a:p>
+          <a:p>
+            <a:pPr marL="0" indent="0">
+              <a:buNone/>
+            </a:pPr>
+            <a:r>
+              <a:rPr lang="en-US" dirty="0">
+                <a:latin typeface="Consolas" panose="020B0609020204030204" pitchFamily="49" charset="0"/>
+              </a:rPr>
+              <a:t>// </a:t>
+            </a:r>
+            <a:r>
+              <a:rPr lang="en-US" dirty="0" err="1">
+                <a:latin typeface="Consolas" panose="020B0609020204030204" pitchFamily="49" charset="0"/>
+              </a:rPr>
+              <a:t>Logik</a:t>
+            </a:r>
+            <a:endParaRPr lang="en-US" dirty="0">
+              <a:latin typeface="Consolas" panose="020B0609020204030204" pitchFamily="49" charset="0"/>
+            </a:endParaRPr>
+          </a:p>
+          <a:p>
+            <a:pPr marL="0" indent="0">
+              <a:buNone/>
+            </a:pPr>
+            <a:r>
+              <a:rPr lang="en-US" dirty="0">
+                <a:latin typeface="Consolas" panose="020B0609020204030204" pitchFamily="49" charset="0"/>
+              </a:rPr>
+              <a:t>}</a:t>
+            </a:r>
+            <a:br>
+              <a:rPr lang="en-US" dirty="0">
+                <a:latin typeface="Consolas" panose="020B0609020204030204" pitchFamily="49" charset="0"/>
+              </a:rPr>
+            </a:br>
+            <a:endParaRPr lang="en-US" dirty="0">
+              <a:latin typeface="Consolas" panose="020B0609020204030204" pitchFamily="49" charset="0"/>
+            </a:endParaRPr>
+          </a:p>
+          <a:p>
+            <a:pPr marL="0" indent="0">
+              <a:buNone/>
+            </a:pPr>
             <a:r>
               <a:rPr lang="en-US" dirty="0"/>
-              <a:t> von </a:t>
+              <a:t>-&gt; </a:t>
             </a:r>
             <a:r>
               <a:rPr lang="en-US" dirty="0" err="1"/>
-              <a:t>anderen</a:t>
-            </a:r>
-            <a:r>
-              <a:rPr lang="en-US" dirty="0"/>
-              <a:t> Klassen “</a:t>
-            </a:r>
-            <a:r>
-              <a:rPr lang="en-US" dirty="0" err="1"/>
-              <a:t>erben</a:t>
-            </a:r>
-            <a:r>
-              <a:rPr lang="en-US" dirty="0"/>
-              <a:t>”.</a:t>
-            </a:r>
-          </a:p>
-          <a:p>
-            <a:r>
-              <a:rPr lang="en-US" dirty="0"/>
-              <a:t>Die </a:t>
-            </a:r>
-            <a:r>
-              <a:rPr lang="en-US" dirty="0" err="1"/>
-              <a:t>erbende</a:t>
+              <a:t>Keine</a:t>
             </a:r>
             <a:r>
               <a:rPr lang="en-US" dirty="0"/>
@@ -4295,163 +4444,36 @@
             </a:r>
             <a:r>
               <a:rPr lang="en-US" dirty="0" err="1"/>
-              <a:t>Klasse</a:t>
+              <a:t>Rückgabe</a:t>
             </a:r>
             <a:r>
               <a:rPr lang="en-US" dirty="0"/>
-              <a:t> </a:t>
-            </a:r>
-            <a:r>
-              <a:rPr lang="en-US" dirty="0" err="1"/>
-              <a:t>erlangt</a:t>
-            </a:r>
-            <a:r>
-              <a:rPr lang="en-US" dirty="0"/>
-              <a:t> </a:t>
-            </a:r>
-            <a:r>
-              <a:rPr lang="en-US" dirty="0" err="1"/>
-              <a:t>dadurch</a:t>
-            </a:r>
-            <a:r>
-              <a:rPr lang="en-US" dirty="0"/>
-              <a:t> </a:t>
-            </a:r>
-            <a:r>
-              <a:rPr lang="en-US" dirty="0" err="1"/>
-              <a:t>Eigenschaften</a:t>
-            </a:r>
-            <a:r>
-              <a:rPr lang="en-US" dirty="0"/>
-              <a:t> der </a:t>
-            </a:r>
-            <a:r>
-              <a:rPr lang="en-US" dirty="0" err="1"/>
-              <a:t>Oberklasse</a:t>
-            </a:r>
-            <a:r>
-              <a:rPr lang="en-US" dirty="0"/>
-              <a:t>.</a:t>
-            </a:r>
-          </a:p>
-          <a:p>
-            <a:r>
-              <a:rPr lang="en-US" dirty="0" err="1"/>
-              <a:t>Vererbung</a:t>
-            </a:r>
-            <a:r>
-              <a:rPr lang="en-US" dirty="0"/>
-              <a:t> </a:t>
-            </a:r>
-            <a:r>
-              <a:rPr lang="en-US" dirty="0" err="1"/>
-              <a:t>wird</a:t>
-            </a:r>
-            <a:r>
-              <a:rPr lang="en-US" dirty="0"/>
-              <a:t> </a:t>
-            </a:r>
-            <a:r>
-              <a:rPr lang="en-US" dirty="0" err="1"/>
-              <a:t>mit</a:t>
-            </a:r>
-            <a:r>
-              <a:rPr lang="en-US" dirty="0"/>
-              <a:t> dem </a:t>
-            </a:r>
-            <a:r>
-              <a:rPr lang="en-US" dirty="0">
-                <a:latin typeface="Consolas" panose="020B0609020204030204" pitchFamily="49" charset="0"/>
-              </a:rPr>
-              <a:t>extends</a:t>
-            </a:r>
-            <a:r>
-              <a:rPr lang="en-US" dirty="0"/>
-              <a:t> Keyword </a:t>
-            </a:r>
-            <a:r>
-              <a:rPr lang="en-US" dirty="0" err="1"/>
-              <a:t>erreicht</a:t>
-            </a:r>
-            <a:r>
-              <a:rPr lang="en-US" dirty="0"/>
-              <a:t>.</a:t>
-            </a:r>
-          </a:p>
-          <a:p>
-            <a:endParaRPr lang="en-US" i="1" dirty="0"/>
-          </a:p>
-          <a:p>
-            <a:r>
-              <a:rPr lang="en-US" i="1" dirty="0"/>
-              <a:t>Was </a:t>
-            </a:r>
-            <a:r>
-              <a:rPr lang="en-US" i="1" dirty="0" err="1"/>
-              <a:t>könnten</a:t>
-            </a:r>
-            <a:r>
-              <a:rPr lang="en-US" i="1" dirty="0"/>
-              <a:t> </a:t>
-            </a:r>
-            <a:r>
-              <a:rPr lang="en-US" i="1" dirty="0" err="1"/>
-              <a:t>sinnvolle</a:t>
-            </a:r>
-            <a:r>
-              <a:rPr lang="en-US" i="1" dirty="0"/>
-              <a:t> </a:t>
-            </a:r>
-            <a:r>
-              <a:rPr lang="en-US" i="1" dirty="0" err="1"/>
-              <a:t>Unterklassen</a:t>
-            </a:r>
-            <a:r>
-              <a:rPr lang="en-US" i="1" dirty="0"/>
-              <a:t> </a:t>
-            </a:r>
-            <a:r>
-              <a:rPr lang="en-US" i="1" dirty="0" err="1"/>
-              <a:t>für</a:t>
-            </a:r>
-            <a:r>
-              <a:rPr lang="en-US" i="1" dirty="0"/>
-              <a:t> </a:t>
-            </a:r>
-            <a:r>
-              <a:rPr lang="en-US" i="1" dirty="0" err="1"/>
-              <a:t>unsere</a:t>
-            </a:r>
-            <a:r>
-              <a:rPr lang="en-US" i="1" dirty="0"/>
-              <a:t> </a:t>
-            </a:r>
-            <a:r>
-              <a:rPr lang="en-US" i="1" dirty="0">
-                <a:latin typeface="Consolas" panose="020B0609020204030204" pitchFamily="49" charset="0"/>
-              </a:rPr>
-              <a:t>Engine</a:t>
-            </a:r>
-            <a:r>
-              <a:rPr lang="en-US" i="1" dirty="0"/>
-              <a:t> </a:t>
-            </a:r>
-            <a:r>
-              <a:rPr lang="en-US" i="1" dirty="0" err="1"/>
-              <a:t>Klasse</a:t>
-            </a:r>
-            <a:r>
-              <a:rPr lang="en-US" i="1" dirty="0"/>
-              <a:t> sein?</a:t>
-            </a:r>
-            <a:endParaRPr lang="de-DE" i="1" dirty="0"/>
+              <a:t>: void</a:t>
+            </a:r>
+            <a:endParaRPr lang="de-DE" dirty="0"/>
+          </a:p>
+          <a:p>
+            <a:pPr marL="0" indent="0">
+              <a:buNone/>
+            </a:pPr>
+            <a:endParaRPr lang="de-DE" dirty="0">
+              <a:latin typeface="Consolas" panose="020B0609020204030204" pitchFamily="49" charset="0"/>
+            </a:endParaRPr>
+          </a:p>
+          <a:p>
+            <a:pPr marL="0" indent="0">
+              <a:buNone/>
+            </a:pPr>
+            <a:endParaRPr lang="de-DE" dirty="0">
+              <a:latin typeface="Consolas" panose="020B0609020204030204" pitchFamily="49" charset="0"/>
+            </a:endParaRPr>
           </a:p>
         </p:txBody>
       </p:sp>
     </p:spTree>
     <p:extLst>
       <p:ext uri="{BB962C8B-B14F-4D97-AF65-F5344CB8AC3E}">
-        <p14:creationId xmlns:p14="http://schemas.microsoft.com/office/powerpoint/2010/main" val="1949152557"/>
+        <p14:creationId xmlns:p14="http://schemas.microsoft.com/office/powerpoint/2010/main" val="2863131098"/>
       </p:ext>
     </p:extLst>
   </p:cSld>
@@ -4483,7 +4505,7 @@
           <p:cNvPr id="2" name="Title 1">
             <a:extLst>
               <a:ext uri="{FF2B5EF4-FFF2-40B4-BE49-F238E27FC236}">
-                <a16:creationId xmlns:a16="http://schemas.microsoft.com/office/drawing/2014/main" id="{9A7F5C4B-F0F0-4739-A9AD-A5C05FE3C318}"/>
+                <a16:creationId xmlns:a16="http://schemas.microsoft.com/office/drawing/2014/main" id="{60B72FCD-8E2F-46F9-92E2-FDD57723B629}"/>
               </a:ext>
             </a:extLst>
           </p:cNvPr>
@@ -4499,18 +4521,18 @@
           <a:bodyPr/>
           <a:lstStyle/>
           <a:p>
-            <a:r>
-              <a:rPr lang="en-US" dirty="0" err="1"/>
-              <a:t>Vererbung</a:t>
-            </a:r>
-            <a:r>
-              <a:rPr lang="en-US" dirty="0"/>
-              <a:t> - </a:t>
-            </a:r>
             <a:r>
               <a:rPr lang="en-US" dirty="0" err="1"/>
               <a:t>Beispiel</a:t>
             </a:r>
+            <a:r>
+              <a:rPr lang="en-US" dirty="0"/>
+              <a:t>: Engine-</a:t>
+            </a:r>
+            <a:r>
+              <a:rPr lang="en-US" dirty="0" err="1"/>
+              <a:t>Klasse</a:t>
+            </a:r>
             <a:endParaRPr lang="de-DE" dirty="0"/>
           </a:p>
         </p:txBody>
@@ -4520,7 +4542,7 @@
           <p:cNvPr id="3" name="Content Placeholder 2">
             <a:extLst>
               <a:ext uri="{FF2B5EF4-FFF2-40B4-BE49-F238E27FC236}">
-                <a16:creationId xmlns:a16="http://schemas.microsoft.com/office/drawing/2014/main" id="{E74F2A5E-7F9D-44E9-BA73-0171BC739690}"/>
+                <a16:creationId xmlns:a16="http://schemas.microsoft.com/office/drawing/2014/main" id="{F70FB673-C264-47C1-9790-750438145FB7}"/>
               </a:ext>
             </a:extLst>
           </p:cNvPr>
@@ -4531,9 +4553,16 @@
             <p:ph idx="1"/>
           </p:nvPr>
         </p:nvSpPr>
-        <p:spPr/>
-        <p:txBody>
-          <a:bodyPr/>
+        <p:spPr>
+          <a:xfrm>
+            <a:off x="838200" y="1825624"/>
+            <a:ext cx="10515600" cy="5032375"/>
+          </a:xfrm>
+        </p:spPr>
+        <p:txBody>
+          <a:bodyPr>
+            <a:normAutofit fontScale="92500" lnSpcReduction="20000"/>
+          </a:bodyPr>
           <a:lstStyle/>
           <a:p>
             <a:pPr marL="0" indent="0">
@@ -4543,19 +4572,60 @@
               <a:rPr lang="en-US" dirty="0">
                 <a:latin typeface="Consolas" panose="020B0609020204030204" pitchFamily="49" charset="0"/>
               </a:rPr>
-              <a:t>public class </a:t>
+              <a:t>public class Engine {</a:t>
+            </a:r>
+          </a:p>
+          <a:p>
+            <a:pPr marL="0" indent="0">
+              <a:buNone/>
+            </a:pPr>
+            <a:r>
+              <a:rPr lang="en-US" dirty="0">
+                <a:latin typeface="Consolas" panose="020B0609020204030204" pitchFamily="49" charset="0"/>
+              </a:rPr>
+              <a:t>	private Integer horsepower;</a:t>
+            </a:r>
+          </a:p>
+          <a:p>
+            <a:pPr marL="0" indent="0">
+              <a:buNone/>
+            </a:pPr>
+            <a:endParaRPr lang="en-US" dirty="0">
+              <a:latin typeface="Consolas" panose="020B0609020204030204" pitchFamily="49" charset="0"/>
+            </a:endParaRPr>
+          </a:p>
+          <a:p>
+            <a:pPr marL="0" indent="0">
+              <a:buNone/>
+            </a:pPr>
+            <a:r>
+              <a:rPr lang="en-US" dirty="0">
+                <a:latin typeface="Consolas" panose="020B0609020204030204" pitchFamily="49" charset="0"/>
+              </a:rPr>
+              <a:t>	public Engine(Integer horsepower){</a:t>
+            </a:r>
+          </a:p>
+          <a:p>
+            <a:pPr marL="0" indent="0">
+              <a:buNone/>
+            </a:pPr>
+            <a:r>
+              <a:rPr lang="en-US" dirty="0">
+                <a:latin typeface="Consolas" panose="020B0609020204030204" pitchFamily="49" charset="0"/>
+              </a:rPr>
+              <a:t>		</a:t>
             </a:r>
             <a:r>
               <a:rPr lang="en-US" dirty="0" err="1">
                 <a:latin typeface="Consolas" panose="020B0609020204030204" pitchFamily="49" charset="0"/>
               </a:rPr>
-              <a:t>DieselEngine</a:t>
+              <a:t>this.horsepower</a:t>
             </a:r>
             <a:r>
               <a:rPr lang="en-US" dirty="0">
                 <a:latin typeface="Consolas" panose="020B0609020204030204" pitchFamily="49" charset="0"/>
               </a:rPr>
-              <a:t> extends Engine {</a:t>
+              <a:t> = horsepower;</a:t>
             </a:r>
           </a:p>
           <a:p>
@@ -4566,19 +4636,41 @@
               <a:rPr lang="en-US" dirty="0">
                 <a:latin typeface="Consolas" panose="020B0609020204030204" pitchFamily="49" charset="0"/>
               </a:rPr>
-              <a:t>	public </a:t>
+              <a:t>	}</a:t>
+            </a:r>
+          </a:p>
+          <a:p>
+            <a:pPr marL="0" indent="0">
+              <a:buNone/>
+            </a:pPr>
+            <a:r>
+              <a:rPr lang="en-US" dirty="0">
+                <a:latin typeface="Consolas" panose="020B0609020204030204" pitchFamily="49" charset="0"/>
+              </a:rPr>
+              <a:t>	</a:t>
+            </a:r>
+          </a:p>
+          <a:p>
+            <a:pPr marL="0" indent="0">
+              <a:buNone/>
+            </a:pPr>
+            <a:r>
+              <a:rPr lang="en-US" dirty="0">
+                <a:latin typeface="Consolas" panose="020B0609020204030204" pitchFamily="49" charset="0"/>
+              </a:rPr>
+              <a:t>	public Integer </a:t>
             </a:r>
             <a:r>
               <a:rPr lang="en-US" dirty="0" err="1">
                 <a:latin typeface="Consolas" panose="020B0609020204030204" pitchFamily="49" charset="0"/>
               </a:rPr>
-              <a:t>DieselEngine</a:t>
+              <a:t>calculateMileage</a:t>
             </a:r>
             <a:r>
               <a:rPr lang="en-US" dirty="0">
                 <a:latin typeface="Consolas" panose="020B0609020204030204" pitchFamily="49" charset="0"/>
               </a:rPr>
-              <a:t>(Integer horsepower){</a:t>
+              <a:t>(Integer rpm){</a:t>
             </a:r>
           </a:p>
           <a:p>
@@ -4589,7 +4681,19 @@
               <a:rPr lang="en-US" dirty="0">
                 <a:latin typeface="Consolas" panose="020B0609020204030204" pitchFamily="49" charset="0"/>
               </a:rPr>
-              <a:t>		super(horsepower);</a:t>
+              <a:t>		return (</a:t>
+            </a:r>
+            <a:r>
+              <a:rPr lang="en-US" dirty="0" err="1">
+                <a:latin typeface="Consolas" panose="020B0609020204030204" pitchFamily="49" charset="0"/>
+              </a:rPr>
+              <a:t>this.horsepower</a:t>
+            </a:r>
+            <a:r>
+              <a:rPr lang="en-US" dirty="0">
+                <a:latin typeface="Consolas" panose="020B0609020204030204" pitchFamily="49" charset="0"/>
+              </a:rPr>
+              <a:t>/100) * (rpm/1000);</a:t>
             </a:r>
           </a:p>
           <a:p>
@@ -4607,105 +4711,30 @@
             <a:pPr marL="0" indent="0">
               <a:buNone/>
             </a:pPr>
-            <a:r>
-              <a:rPr lang="de-DE" dirty="0">
+            <a:endParaRPr lang="en-US" dirty="0">
+              <a:latin typeface="Consolas" panose="020B0609020204030204" pitchFamily="49" charset="0"/>
+            </a:endParaRPr>
+          </a:p>
+          <a:p>
+            <a:pPr marL="0" indent="0">
+              <a:buNone/>
+            </a:pPr>
+            <a:r>
+              <a:rPr lang="en-US" dirty="0">
                 <a:latin typeface="Consolas" panose="020B0609020204030204" pitchFamily="49" charset="0"/>
               </a:rPr>
               <a:t>}</a:t>
             </a:r>
           </a:p>
           <a:p>
-            <a:pPr marL="0" indent="0">
-              <a:buNone/>
-            </a:pPr>
             <a:endParaRPr lang="de-DE" dirty="0"/>
-          </a:p>
-          <a:p>
-            <a:pPr marL="0" indent="0">
-              <a:buNone/>
-            </a:pPr>
-            <a:r>
-              <a:rPr lang="de-DE" i="1" dirty="0"/>
-              <a:t>-&gt; Die</a:t>
-            </a:r>
-            <a:r>
-              <a:rPr lang="en-US" i="1" dirty="0"/>
-              <a:t> </a:t>
-            </a:r>
-            <a:r>
-              <a:rPr lang="en-US" i="1" dirty="0" err="1">
-                <a:latin typeface="Consolas" panose="020B0609020204030204" pitchFamily="49" charset="0"/>
-              </a:rPr>
-              <a:t>calculateMileage</a:t>
-            </a:r>
-            <a:r>
-              <a:rPr lang="en-US" i="1" dirty="0"/>
-              <a:t> </a:t>
-            </a:r>
-            <a:r>
-              <a:rPr lang="en-US" i="1" dirty="0" err="1"/>
-              <a:t>Methode</a:t>
-            </a:r>
-            <a:r>
-              <a:rPr lang="en-US" i="1" dirty="0"/>
-              <a:t> </a:t>
-            </a:r>
-            <a:r>
-              <a:rPr lang="en-US" i="1" dirty="0" err="1"/>
-              <a:t>stimmt</a:t>
-            </a:r>
-            <a:r>
-              <a:rPr lang="en-US" i="1" dirty="0"/>
-              <a:t> </a:t>
-            </a:r>
-            <a:r>
-              <a:rPr lang="en-US" i="1" dirty="0" err="1"/>
-              <a:t>für</a:t>
-            </a:r>
-            <a:r>
-              <a:rPr lang="en-US" i="1" dirty="0"/>
-              <a:t> den Diesel </a:t>
-            </a:r>
-            <a:r>
-              <a:rPr lang="en-US" i="1" dirty="0" err="1"/>
-              <a:t>nicht</a:t>
-            </a:r>
-            <a:r>
-              <a:rPr lang="en-US" i="1" dirty="0"/>
-              <a:t>. Wie </a:t>
-            </a:r>
-            <a:r>
-              <a:rPr lang="en-US" i="1" dirty="0" err="1"/>
-              <a:t>kann</a:t>
-            </a:r>
-            <a:r>
-              <a:rPr lang="en-US" i="1" dirty="0"/>
-              <a:t> das </a:t>
-            </a:r>
-            <a:r>
-              <a:rPr lang="en-US" i="1" dirty="0" err="1"/>
-              <a:t>gelöst</a:t>
-            </a:r>
-            <a:r>
-              <a:rPr lang="en-US" i="1" dirty="0"/>
-              <a:t> </a:t>
-            </a:r>
-            <a:r>
-              <a:rPr lang="en-US" i="1" dirty="0" err="1"/>
-              <a:t>werden</a:t>
-            </a:r>
-            <a:r>
-              <a:rPr lang="en-US" i="1" dirty="0"/>
-              <a:t>?</a:t>
-            </a:r>
-            <a:endParaRPr lang="de-DE" i="1" dirty="0"/>
           </a:p>
         </p:txBody>
       </p:sp>
     </p:spTree>
     <p:extLst>
       <p:ext uri="{BB962C8B-B14F-4D97-AF65-F5344CB8AC3E}">
-        <p14:creationId xmlns:p14="http://schemas.microsoft.com/office/powerpoint/2010/main" val="471736552"/>
+        <p14:creationId xmlns:p14="http://schemas.microsoft.com/office/powerpoint/2010/main" val="3110209038"/>
       </p:ext>
     </p:extLst>
   </p:cSld>
@@ -4737,7 +4766,7 @@
           <p:cNvPr id="2" name="Title 1">
             <a:extLst>
               <a:ext uri="{FF2B5EF4-FFF2-40B4-BE49-F238E27FC236}">
-                <a16:creationId xmlns:a16="http://schemas.microsoft.com/office/drawing/2014/main" id="{3AA28C1B-8E05-48A3-A22A-767400A8390B}"/>
+                <a16:creationId xmlns:a16="http://schemas.microsoft.com/office/drawing/2014/main" id="{534D15F0-276C-4F0C-BFE8-15E5400839A6}"/>
               </a:ext>
             </a:extLst>
           </p:cNvPr>
@@ -4757,134 +4786,232 @@
               <a:rPr lang="en-US" dirty="0" err="1"/>
               <a:t>Vererbung</a:t>
             </a:r>
+            <a:endParaRPr lang="de-DE" dirty="0"/>
+          </a:p>
+        </p:txBody>
+      </p:sp>
+      <p:sp>
+        <p:nvSpPr>
+          <p:cNvPr id="3" name="Content Placeholder 2">
+            <a:extLst>
+              <a:ext uri="{FF2B5EF4-FFF2-40B4-BE49-F238E27FC236}">
+                <a16:creationId xmlns:a16="http://schemas.microsoft.com/office/drawing/2014/main" id="{632BDF9C-048E-4C94-BB9D-D9E0A04A8EFF}"/>
+              </a:ext>
+            </a:extLst>
+          </p:cNvPr>
+          <p:cNvSpPr>
+            <a:spLocks noGrp="1"/>
+          </p:cNvSpPr>
+          <p:nvPr>
+            <p:ph idx="1"/>
+          </p:nvPr>
+        </p:nvSpPr>
+        <p:spPr/>
+        <p:txBody>
+          <a:bodyPr/>
+          <a:lstStyle/>
+          <a:p>
             <a:r>
               <a:rPr lang="en-US" dirty="0"/>
-              <a:t> - </a:t>
+              <a:t>Klassen </a:t>
             </a:r>
             <a:r>
               <a:rPr lang="en-US" dirty="0" err="1"/>
-              <a:t>Überschreiben</a:t>
-            </a:r>
-            <a:endParaRPr lang="de-DE" dirty="0"/>
-          </a:p>
-        </p:txBody>
-      </p:sp>
-      <p:sp>
-        <p:nvSpPr>
-          <p:cNvPr id="3" name="Content Placeholder 2">
-            <a:extLst>
-              <a:ext uri="{FF2B5EF4-FFF2-40B4-BE49-F238E27FC236}">
-                <a16:creationId xmlns:a16="http://schemas.microsoft.com/office/drawing/2014/main" id="{ED170B5E-7FE8-45B4-B68A-2CF5E26E5D15}"/>
-              </a:ext>
-            </a:extLst>
-          </p:cNvPr>
-          <p:cNvSpPr>
-            <a:spLocks noGrp="1"/>
-          </p:cNvSpPr>
-          <p:nvPr>
-            <p:ph idx="1"/>
-          </p:nvPr>
-        </p:nvSpPr>
-        <p:spPr/>
-        <p:txBody>
-          <a:bodyPr/>
-          <a:lstStyle/>
-          <a:p>
-            <a:pPr marL="0" indent="0">
-              <a:buNone/>
-            </a:pPr>
+              <a:t>können</a:t>
+            </a:r>
+            <a:r>
+              <a:rPr lang="en-US" dirty="0"/>
+              <a:t> von </a:t>
+            </a:r>
+            <a:r>
+              <a:rPr lang="en-US" dirty="0" err="1"/>
+              <a:t>anderen</a:t>
+            </a:r>
+            <a:r>
+              <a:rPr lang="en-US" dirty="0"/>
+              <a:t> Klassen “</a:t>
+            </a:r>
+            <a:r>
+              <a:rPr lang="en-US" dirty="0" err="1"/>
+              <a:t>erben</a:t>
+            </a:r>
+            <a:r>
+              <a:rPr lang="en-US" dirty="0"/>
+              <a:t>”.</a:t>
+            </a:r>
+          </a:p>
+          <a:p>
+            <a:r>
+              <a:rPr lang="en-US" dirty="0"/>
+              <a:t>Die </a:t>
+            </a:r>
+            <a:r>
+              <a:rPr lang="en-US" dirty="0" err="1"/>
+              <a:t>erbende</a:t>
+            </a:r>
+            <a:r>
+              <a:rPr lang="en-US" dirty="0"/>
+              <a:t> </a:t>
+            </a:r>
+            <a:r>
+              <a:rPr lang="en-US" dirty="0" err="1"/>
+              <a:t>Klasse</a:t>
+            </a:r>
+            <a:r>
+              <a:rPr lang="en-US" dirty="0"/>
+              <a:t> </a:t>
+            </a:r>
+            <a:r>
+              <a:rPr lang="en-US" dirty="0" err="1"/>
+              <a:t>erlangt</a:t>
+            </a:r>
+            <a:r>
+              <a:rPr lang="en-US" dirty="0"/>
+              <a:t> </a:t>
+            </a:r>
+            <a:r>
+              <a:rPr lang="en-US" dirty="0" err="1"/>
+              <a:t>dadurch</a:t>
+            </a:r>
+            <a:r>
+              <a:rPr lang="en-US" dirty="0"/>
+              <a:t> </a:t>
+            </a:r>
+            <a:r>
+              <a:rPr lang="en-US" dirty="0" err="1"/>
+              <a:t>Eigenschaften</a:t>
+            </a:r>
+            <a:r>
+              <a:rPr lang="en-US" dirty="0"/>
+              <a:t> der </a:t>
+            </a:r>
+            <a:r>
+              <a:rPr lang="en-US" dirty="0" err="1"/>
+              <a:t>Oberklasse</a:t>
+            </a:r>
+            <a:r>
+              <a:rPr lang="en-US" dirty="0"/>
+              <a:t>.</a:t>
+            </a:r>
+          </a:p>
+          <a:p>
+            <a:r>
+              <a:rPr lang="en-US" dirty="0" err="1"/>
+              <a:t>Vererbung</a:t>
+            </a:r>
+            <a:r>
+              <a:rPr lang="en-US" dirty="0"/>
+              <a:t> </a:t>
+            </a:r>
+            <a:r>
+              <a:rPr lang="en-US" dirty="0" err="1"/>
+              <a:t>wird</a:t>
+            </a:r>
+            <a:r>
+              <a:rPr lang="en-US" dirty="0"/>
+              <a:t> </a:t>
+            </a:r>
+            <a:r>
+              <a:rPr lang="en-US" dirty="0" err="1"/>
+              <a:t>mit</a:t>
+            </a:r>
+            <a:r>
+              <a:rPr lang="en-US" dirty="0"/>
+              <a:t> dem </a:t>
+            </a:r>
             <a:r>
               <a:rPr lang="en-US" dirty="0">
                 <a:latin typeface="Consolas" panose="020B0609020204030204" pitchFamily="49" charset="0"/>
               </a:rPr>
-              <a:t>public Integer </a:t>
-            </a:r>
-            <a:r>
-              <a:rPr lang="en-US" dirty="0" err="1">
-                <a:latin typeface="Consolas" panose="020B0609020204030204" pitchFamily="49" charset="0"/>
-              </a:rPr>
-              <a:t>calculateMileage</a:t>
-            </a:r>
-            <a:r>
-              <a:rPr lang="en-US" dirty="0">
-                <a:latin typeface="Consolas" panose="020B0609020204030204" pitchFamily="49" charset="0"/>
-              </a:rPr>
-              <a:t>(Integer rpm){</a:t>
-            </a:r>
-          </a:p>
-          <a:p>
-            <a:pPr marL="0" indent="0">
-              <a:buNone/>
-            </a:pPr>
-            <a:r>
-              <a:rPr lang="en-US" dirty="0">
-                <a:latin typeface="Consolas" panose="020B0609020204030204" pitchFamily="49" charset="0"/>
-              </a:rPr>
-              <a:t>		return (</a:t>
-            </a:r>
-            <a:r>
-              <a:rPr lang="en-US" dirty="0" err="1">
-                <a:latin typeface="Consolas" panose="020B0609020204030204" pitchFamily="49" charset="0"/>
-              </a:rPr>
-              <a:t>super.horsepower</a:t>
-            </a:r>
-            <a:r>
-              <a:rPr lang="en-US" dirty="0">
-                <a:latin typeface="Consolas" panose="020B0609020204030204" pitchFamily="49" charset="0"/>
-              </a:rPr>
-              <a:t>/110) * (rpm/1000);</a:t>
-            </a:r>
-          </a:p>
-          <a:p>
-            <a:pPr marL="0" indent="0">
-              <a:buNone/>
-            </a:pPr>
-            <a:r>
-              <a:rPr lang="en-US" dirty="0">
-                <a:latin typeface="Consolas" panose="020B0609020204030204" pitchFamily="49" charset="0"/>
-              </a:rPr>
-              <a:t>}</a:t>
-            </a:r>
-          </a:p>
-          <a:p>
-            <a:pPr marL="0" indent="0">
-              <a:buNone/>
-            </a:pPr>
-            <a:endParaRPr lang="de-DE" dirty="0"/>
-          </a:p>
-          <a:p>
-            <a:pPr marL="0" indent="0">
-              <a:buNone/>
-            </a:pPr>
-            <a:r>
-              <a:rPr lang="de-DE" dirty="0"/>
-              <a:t>-&gt; Gleiche Signatur überschreibt das Verhalten der Oberklasse.</a:t>
-            </a:r>
-          </a:p>
-          <a:p>
-            <a:pPr marL="0" indent="0">
-              <a:buNone/>
-            </a:pPr>
-            <a:r>
-              <a:rPr lang="de-DE" dirty="0"/>
-              <a:t>Die Signatur ist, vereinfacht gesagt, die Kopfzeile einer Methode.</a:t>
-            </a:r>
-          </a:p>
-          <a:p>
-            <a:pPr marL="0" indent="0">
-              <a:buNone/>
-            </a:pPr>
-            <a:r>
-              <a:rPr lang="de-DE" dirty="0"/>
-              <a:t>Nicht verwechseln mit Überladen. Hier ist die Signatur eine andere.</a:t>
-            </a:r>
+              <a:t>extends</a:t>
+            </a:r>
+            <a:r>
+              <a:rPr lang="en-US" dirty="0"/>
+              <a:t> Keyword </a:t>
+            </a:r>
+            <a:r>
+              <a:rPr lang="en-US" dirty="0" err="1"/>
+              <a:t>erreicht</a:t>
+            </a:r>
+            <a:r>
+              <a:rPr lang="en-US" dirty="0"/>
+              <a:t>.</a:t>
+            </a:r>
+          </a:p>
+          <a:p>
+            <a:endParaRPr lang="en-US" i="1" dirty="0"/>
+          </a:p>
+          <a:p>
+            <a:r>
+              <a:rPr lang="en-US" i="1" dirty="0"/>
+              <a:t>Was </a:t>
+            </a:r>
+            <a:r>
+              <a:rPr lang="en-US" i="1" dirty="0" err="1"/>
+              <a:t>könnten</a:t>
+            </a:r>
+            <a:r>
+              <a:rPr lang="en-US" i="1" dirty="0"/>
+              <a:t> </a:t>
+            </a:r>
+            <a:r>
+              <a:rPr lang="en-US" i="1" dirty="0" err="1"/>
+              <a:t>sinnvolle</a:t>
+            </a:r>
+            <a:r>
+              <a:rPr lang="en-US" i="1" dirty="0"/>
+              <a:t> </a:t>
+            </a:r>
+            <a:r>
+              <a:rPr lang="en-US" i="1" dirty="0" err="1"/>
+              <a:t>Unterklassen</a:t>
+            </a:r>
+            <a:r>
+              <a:rPr lang="en-US" i="1" dirty="0"/>
+              <a:t> </a:t>
+            </a:r>
+            <a:r>
+              <a:rPr lang="en-US" i="1" dirty="0" err="1"/>
+              <a:t>für</a:t>
+            </a:r>
+            <a:r>
+              <a:rPr lang="en-US" i="1" dirty="0"/>
+              <a:t> </a:t>
+            </a:r>
+            <a:r>
+              <a:rPr lang="en-US" i="1" dirty="0" err="1"/>
+              <a:t>unsere</a:t>
+            </a:r>
+            <a:r>
+              <a:rPr lang="en-US" i="1" dirty="0"/>
+              <a:t> </a:t>
+            </a:r>
+            <a:r>
+              <a:rPr lang="en-US" i="1" dirty="0">
+                <a:latin typeface="Consolas" panose="020B0609020204030204" pitchFamily="49" charset="0"/>
+              </a:rPr>
+              <a:t>Engine</a:t>
+            </a:r>
+            <a:r>
+              <a:rPr lang="en-US" i="1" dirty="0"/>
+              <a:t> </a:t>
+            </a:r>
+            <a:r>
+              <a:rPr lang="en-US" i="1" dirty="0" err="1"/>
+              <a:t>Klasse</a:t>
+            </a:r>
+            <a:r>
+              <a:rPr lang="en-US" i="1" dirty="0"/>
+              <a:t> sein?</a:t>
+            </a:r>
+            <a:endParaRPr lang="de-DE" i="1" dirty="0"/>
           </a:p>
         </p:txBody>
       </p:sp>
     </p:spTree>
     <p:extLst>
       <p:ext uri="{BB962C8B-B14F-4D97-AF65-F5344CB8AC3E}">
-        <p14:creationId xmlns:p14="http://schemas.microsoft.com/office/powerpoint/2010/main" val="3666902017"/>
+        <p14:creationId xmlns:p14="http://schemas.microsoft.com/office/powerpoint/2010/main" val="1949152557"/>
       </p:ext>
     </p:extLst>
   </p:cSld>
@@ -4916,6 +5043,439 @@
           <p:cNvPr id="2" name="Title 1">
             <a:extLst>
               <a:ext uri="{FF2B5EF4-FFF2-40B4-BE49-F238E27FC236}">
+                <a16:creationId xmlns:a16="http://schemas.microsoft.com/office/drawing/2014/main" id="{9A7F5C4B-F0F0-4739-A9AD-A5C05FE3C318}"/>
+              </a:ext>
+            </a:extLst>
+          </p:cNvPr>
+          <p:cNvSpPr>
+            <a:spLocks noGrp="1"/>
+          </p:cNvSpPr>
+          <p:nvPr>
+            <p:ph type="title"/>
+          </p:nvPr>
+        </p:nvSpPr>
+        <p:spPr/>
+        <p:txBody>
+          <a:bodyPr/>
+          <a:lstStyle/>
+          <a:p>
+            <a:r>
+              <a:rPr lang="en-US" dirty="0" err="1"/>
+              <a:t>Vererbung</a:t>
+            </a:r>
+            <a:r>
+              <a:rPr lang="en-US" dirty="0"/>
+              <a:t> - </a:t>
+            </a:r>
+            <a:r>
+              <a:rPr lang="en-US" dirty="0" err="1"/>
+              <a:t>Beispiel</a:t>
+            </a:r>
+            <a:endParaRPr lang="de-DE" dirty="0"/>
+          </a:p>
+        </p:txBody>
+      </p:sp>
+      <p:sp>
+        <p:nvSpPr>
+          <p:cNvPr id="3" name="Content Placeholder 2">
+            <a:extLst>
+              <a:ext uri="{FF2B5EF4-FFF2-40B4-BE49-F238E27FC236}">
+                <a16:creationId xmlns:a16="http://schemas.microsoft.com/office/drawing/2014/main" id="{E74F2A5E-7F9D-44E9-BA73-0171BC739690}"/>
+              </a:ext>
+            </a:extLst>
+          </p:cNvPr>
+          <p:cNvSpPr>
+            <a:spLocks noGrp="1"/>
+          </p:cNvSpPr>
+          <p:nvPr>
+            <p:ph idx="1"/>
+          </p:nvPr>
+        </p:nvSpPr>
+        <p:spPr/>
+        <p:txBody>
+          <a:bodyPr/>
+          <a:lstStyle/>
+          <a:p>
+            <a:pPr marL="0" indent="0">
+              <a:buNone/>
+            </a:pPr>
+            <a:r>
+              <a:rPr lang="en-US" dirty="0">
+                <a:latin typeface="Consolas" panose="020B0609020204030204" pitchFamily="49" charset="0"/>
+              </a:rPr>
+              <a:t>public class </a:t>
+            </a:r>
+            <a:r>
+              <a:rPr lang="en-US" dirty="0" err="1">
+                <a:latin typeface="Consolas" panose="020B0609020204030204" pitchFamily="49" charset="0"/>
+              </a:rPr>
+              <a:t>DieselEngine</a:t>
+            </a:r>
+            <a:r>
+              <a:rPr lang="en-US" dirty="0">
+                <a:latin typeface="Consolas" panose="020B0609020204030204" pitchFamily="49" charset="0"/>
+              </a:rPr>
+              <a:t> extends Engine {</a:t>
+            </a:r>
+          </a:p>
+          <a:p>
+            <a:pPr marL="0" indent="0">
+              <a:buNone/>
+            </a:pPr>
+            <a:r>
+              <a:rPr lang="en-US" dirty="0">
+                <a:latin typeface="Consolas" panose="020B0609020204030204" pitchFamily="49" charset="0"/>
+              </a:rPr>
+              <a:t>	public </a:t>
+            </a:r>
+            <a:r>
+              <a:rPr lang="en-US" dirty="0" err="1">
+                <a:latin typeface="Consolas" panose="020B0609020204030204" pitchFamily="49" charset="0"/>
+              </a:rPr>
+              <a:t>DieselEngine</a:t>
+            </a:r>
+            <a:r>
+              <a:rPr lang="en-US" dirty="0">
+                <a:latin typeface="Consolas" panose="020B0609020204030204" pitchFamily="49" charset="0"/>
+              </a:rPr>
+              <a:t>(Integer horsepower){</a:t>
+            </a:r>
+          </a:p>
+          <a:p>
+            <a:pPr marL="0" indent="0">
+              <a:buNone/>
+            </a:pPr>
+            <a:r>
+              <a:rPr lang="en-US" dirty="0">
+                <a:latin typeface="Consolas" panose="020B0609020204030204" pitchFamily="49" charset="0"/>
+              </a:rPr>
+              <a:t>		super(horsepower);</a:t>
+            </a:r>
+          </a:p>
+          <a:p>
+            <a:pPr marL="0" indent="0">
+              <a:buNone/>
+            </a:pPr>
+            <a:r>
+              <a:rPr lang="en-US" dirty="0">
+                <a:latin typeface="Consolas" panose="020B0609020204030204" pitchFamily="49" charset="0"/>
+              </a:rPr>
+              <a:t>	}</a:t>
+            </a:r>
+          </a:p>
+          <a:p>
+            <a:pPr marL="0" indent="0">
+              <a:buNone/>
+            </a:pPr>
+            <a:r>
+              <a:rPr lang="de-DE" dirty="0">
+                <a:latin typeface="Consolas" panose="020B0609020204030204" pitchFamily="49" charset="0"/>
+              </a:rPr>
+              <a:t>}</a:t>
+            </a:r>
+          </a:p>
+          <a:p>
+            <a:pPr marL="0" indent="0">
+              <a:buNone/>
+            </a:pPr>
+            <a:endParaRPr lang="de-DE" dirty="0"/>
+          </a:p>
+          <a:p>
+            <a:pPr marL="0" indent="0">
+              <a:buNone/>
+            </a:pPr>
+            <a:r>
+              <a:rPr lang="de-DE" i="1" dirty="0"/>
+              <a:t>-&gt; Die</a:t>
+            </a:r>
+            <a:r>
+              <a:rPr lang="en-US" i="1" dirty="0"/>
+              <a:t> </a:t>
+            </a:r>
+            <a:r>
+              <a:rPr lang="en-US" i="1" dirty="0" err="1">
+                <a:latin typeface="Consolas" panose="020B0609020204030204" pitchFamily="49" charset="0"/>
+              </a:rPr>
+              <a:t>calculateMileage</a:t>
+            </a:r>
+            <a:r>
+              <a:rPr lang="en-US" i="1" dirty="0"/>
+              <a:t> </a:t>
+            </a:r>
+            <a:r>
+              <a:rPr lang="en-US" i="1" dirty="0" err="1"/>
+              <a:t>Methode</a:t>
+            </a:r>
+            <a:r>
+              <a:rPr lang="en-US" i="1" dirty="0"/>
+              <a:t> </a:t>
+            </a:r>
+            <a:r>
+              <a:rPr lang="en-US" i="1" dirty="0" err="1"/>
+              <a:t>stimmt</a:t>
+            </a:r>
+            <a:r>
+              <a:rPr lang="en-US" i="1" dirty="0"/>
+              <a:t> </a:t>
+            </a:r>
+            <a:r>
+              <a:rPr lang="en-US" i="1" dirty="0" err="1"/>
+              <a:t>für</a:t>
+            </a:r>
+            <a:r>
+              <a:rPr lang="en-US" i="1" dirty="0"/>
+              <a:t> den Diesel </a:t>
+            </a:r>
+            <a:r>
+              <a:rPr lang="en-US" i="1" dirty="0" err="1"/>
+              <a:t>nicht</a:t>
+            </a:r>
+            <a:r>
+              <a:rPr lang="en-US" i="1" dirty="0"/>
+              <a:t>. Wie </a:t>
+            </a:r>
+            <a:r>
+              <a:rPr lang="en-US" i="1" dirty="0" err="1"/>
+              <a:t>kann</a:t>
+            </a:r>
+            <a:r>
+              <a:rPr lang="en-US" i="1" dirty="0"/>
+              <a:t> das </a:t>
+            </a:r>
+            <a:r>
+              <a:rPr lang="en-US" i="1" dirty="0" err="1"/>
+              <a:t>gelöst</a:t>
+            </a:r>
+            <a:r>
+              <a:rPr lang="en-US" i="1" dirty="0"/>
+              <a:t> </a:t>
+            </a:r>
+            <a:r>
+              <a:rPr lang="en-US" i="1" dirty="0" err="1"/>
+              <a:t>werden</a:t>
+            </a:r>
+            <a:r>
+              <a:rPr lang="en-US" i="1" dirty="0"/>
+              <a:t>?</a:t>
+            </a:r>
+            <a:endParaRPr lang="de-DE" i="1" dirty="0"/>
+          </a:p>
+        </p:txBody>
+      </p:sp>
+    </p:spTree>
+    <p:extLst>
+      <p:ext uri="{BB962C8B-B14F-4D97-AF65-F5344CB8AC3E}">
+        <p14:creationId xmlns:p14="http://schemas.microsoft.com/office/powerpoint/2010/main" val="471736552"/>
+      </p:ext>
+    </p:extLst>
+  </p:cSld>
+  <p:clrMapOvr>
+    <a:masterClrMapping/>
+  </p:clrMapOvr>
+</p:sld>
+</file>
+
+<file path=ppt/slides/slide15.xml><?xml version="1.0" encoding="utf-8"?>
+<p:sld xmlns:a="http://schemas.openxmlformats.org/drawingml/2006/main" xmlns:r="http://schemas.openxmlformats.org/officeDocument/2006/relationships" xmlns:p="http://schemas.openxmlformats.org/presentationml/2006/main">
+  <p:cSld>
+    <p:spTree>
+      <p:nvGrpSpPr>
+        <p:cNvPr id="1" name=""/>
+        <p:cNvGrpSpPr/>
+        <p:nvPr/>
+      </p:nvGrpSpPr>
+      <p:grpSpPr>
+        <a:xfrm>
+          <a:off x="0" y="0"/>
+          <a:ext cx="0" cy="0"/>
+          <a:chOff x="0" y="0"/>
+          <a:chExt cx="0" cy="0"/>
+        </a:xfrm>
+      </p:grpSpPr>
+      <p:sp>
+        <p:nvSpPr>
+          <p:cNvPr id="2" name="Title 1">
+            <a:extLst>
+              <a:ext uri="{FF2B5EF4-FFF2-40B4-BE49-F238E27FC236}">
+                <a16:creationId xmlns:a16="http://schemas.microsoft.com/office/drawing/2014/main" id="{3AA28C1B-8E05-48A3-A22A-767400A8390B}"/>
+              </a:ext>
+            </a:extLst>
+          </p:cNvPr>
+          <p:cNvSpPr>
+            <a:spLocks noGrp="1"/>
+          </p:cNvSpPr>
+          <p:nvPr>
+            <p:ph type="title"/>
+          </p:nvPr>
+        </p:nvSpPr>
+        <p:spPr/>
+        <p:txBody>
+          <a:bodyPr/>
+          <a:lstStyle/>
+          <a:p>
+            <a:r>
+              <a:rPr lang="en-US" dirty="0" err="1"/>
+              <a:t>Vererbung</a:t>
+            </a:r>
+            <a:r>
+              <a:rPr lang="en-US" dirty="0"/>
+              <a:t> - </a:t>
+            </a:r>
+            <a:r>
+              <a:rPr lang="en-US" dirty="0" err="1"/>
+              <a:t>Überschreiben</a:t>
+            </a:r>
+            <a:endParaRPr lang="de-DE" dirty="0"/>
+          </a:p>
+        </p:txBody>
+      </p:sp>
+      <p:sp>
+        <p:nvSpPr>
+          <p:cNvPr id="3" name="Content Placeholder 2">
+            <a:extLst>
+              <a:ext uri="{FF2B5EF4-FFF2-40B4-BE49-F238E27FC236}">
+                <a16:creationId xmlns:a16="http://schemas.microsoft.com/office/drawing/2014/main" id="{ED170B5E-7FE8-45B4-B68A-2CF5E26E5D15}"/>
+              </a:ext>
+            </a:extLst>
+          </p:cNvPr>
+          <p:cNvSpPr>
+            <a:spLocks noGrp="1"/>
+          </p:cNvSpPr>
+          <p:nvPr>
+            <p:ph idx="1"/>
+          </p:nvPr>
+        </p:nvSpPr>
+        <p:spPr/>
+        <p:txBody>
+          <a:bodyPr/>
+          <a:lstStyle/>
+          <a:p>
+            <a:pPr marL="0" indent="0">
+              <a:buNone/>
+            </a:pPr>
+            <a:r>
+              <a:rPr lang="en-US" dirty="0">
+                <a:latin typeface="Consolas" panose="020B0609020204030204" pitchFamily="49" charset="0"/>
+              </a:rPr>
+              <a:t>public Integer </a:t>
+            </a:r>
+            <a:r>
+              <a:rPr lang="en-US" dirty="0" err="1">
+                <a:latin typeface="Consolas" panose="020B0609020204030204" pitchFamily="49" charset="0"/>
+              </a:rPr>
+              <a:t>calculateMileage</a:t>
+            </a:r>
+            <a:r>
+              <a:rPr lang="en-US" dirty="0">
+                <a:latin typeface="Consolas" panose="020B0609020204030204" pitchFamily="49" charset="0"/>
+              </a:rPr>
+              <a:t>(Integer rpm){</a:t>
+            </a:r>
+          </a:p>
+          <a:p>
+            <a:pPr marL="0" indent="0">
+              <a:buNone/>
+            </a:pPr>
+            <a:r>
+              <a:rPr lang="en-US" dirty="0">
+                <a:latin typeface="Consolas" panose="020B0609020204030204" pitchFamily="49" charset="0"/>
+              </a:rPr>
+              <a:t>		return (</a:t>
+            </a:r>
+            <a:r>
+              <a:rPr lang="en-US" dirty="0" err="1">
+                <a:latin typeface="Consolas" panose="020B0609020204030204" pitchFamily="49" charset="0"/>
+              </a:rPr>
+              <a:t>super.horsepower</a:t>
+            </a:r>
+            <a:r>
+              <a:rPr lang="en-US" dirty="0">
+                <a:latin typeface="Consolas" panose="020B0609020204030204" pitchFamily="49" charset="0"/>
+              </a:rPr>
+              <a:t>/110) * (rpm/1000);</a:t>
+            </a:r>
+          </a:p>
+          <a:p>
+            <a:pPr marL="0" indent="0">
+              <a:buNone/>
+            </a:pPr>
+            <a:r>
+              <a:rPr lang="en-US" dirty="0">
+                <a:latin typeface="Consolas" panose="020B0609020204030204" pitchFamily="49" charset="0"/>
+              </a:rPr>
+              <a:t>}</a:t>
+            </a:r>
+          </a:p>
+          <a:p>
+            <a:pPr marL="0" indent="0">
+              <a:buNone/>
+            </a:pPr>
+            <a:endParaRPr lang="de-DE" dirty="0"/>
+          </a:p>
+          <a:p>
+            <a:pPr marL="0" indent="0">
+              <a:buNone/>
+            </a:pPr>
+            <a:r>
+              <a:rPr lang="de-DE" dirty="0"/>
+              <a:t>-&gt; Gleiche Signatur überschreibt das Verhalten der Oberklasse.</a:t>
+            </a:r>
+          </a:p>
+          <a:p>
+            <a:pPr marL="0" indent="0">
+              <a:buNone/>
+            </a:pPr>
+            <a:r>
+              <a:rPr lang="de-DE" dirty="0"/>
+              <a:t>Die Signatur ist, vereinfacht gesagt, die Kopfzeile einer Methode.</a:t>
+            </a:r>
+          </a:p>
+          <a:p>
+            <a:pPr marL="0" indent="0">
+              <a:buNone/>
+            </a:pPr>
+            <a:r>
+              <a:rPr lang="de-DE" dirty="0"/>
+              <a:t>Nicht verwechseln mit Überladen. Hier ist die Signatur eine andere.</a:t>
+            </a:r>
+          </a:p>
+        </p:txBody>
+      </p:sp>
+    </p:spTree>
+    <p:extLst>
+      <p:ext uri="{BB962C8B-B14F-4D97-AF65-F5344CB8AC3E}">
+        <p14:creationId xmlns:p14="http://schemas.microsoft.com/office/powerpoint/2010/main" val="3666902017"/>
+      </p:ext>
+    </p:extLst>
+  </p:cSld>
+  <p:clrMapOvr>
+    <a:masterClrMapping/>
+  </p:clrMapOvr>
+</p:sld>
+</file>
+
+<file path=ppt/slides/slide16.xml><?xml version="1.0" encoding="utf-8"?>
+<p:sld xmlns:a="http://schemas.openxmlformats.org/drawingml/2006/main" xmlns:r="http://schemas.openxmlformats.org/officeDocument/2006/relationships" xmlns:p="http://schemas.openxmlformats.org/presentationml/2006/main">
+  <p:cSld>
+    <p:spTree>
+      <p:nvGrpSpPr>
+        <p:cNvPr id="1" name=""/>
+        <p:cNvGrpSpPr/>
+        <p:nvPr/>
+      </p:nvGrpSpPr>
+      <p:grpSpPr>
+        <a:xfrm>
+          <a:off x="0" y="0"/>
+          <a:ext cx="0" cy="0"/>
+          <a:chOff x="0" y="0"/>
+          <a:chExt cx="0" cy="0"/>
+        </a:xfrm>
+      </p:grpSpPr>
+      <p:sp>
+        <p:nvSpPr>
+          <p:cNvPr id="2" name="Title 1">
+            <a:extLst>
+              <a:ext uri="{FF2B5EF4-FFF2-40B4-BE49-F238E27FC236}">
                 <a16:creationId xmlns:a16="http://schemas.microsoft.com/office/drawing/2014/main" id="{F2186122-2373-4822-836D-F44D42C9018B}"/>
               </a:ext>
             </a:extLst>
@@ -5046,7 +5606,7 @@
 </p:sld>
 </file>
 
-<file path=ppt/slides/slide15.xml><?xml version="1.0" encoding="utf-8"?>
+<file path=ppt/slides/slide17.xml><?xml version="1.0" encoding="utf-8"?>
 <p:sld xmlns:a="http://schemas.openxmlformats.org/drawingml/2006/main" xmlns:r="http://schemas.openxmlformats.org/officeDocument/2006/relationships" xmlns:p="http://schemas.openxmlformats.org/presentationml/2006/main">
   <p:cSld>
     <p:spTree>
@@ -5185,7 +5745,7 @@
 </p:sld>
 </file>
 
-<file path=ppt/slides/slide16.xml><?xml version="1.0" encoding="utf-8"?>
+<file path=ppt/slides/slide18.xml><?xml version="1.0" encoding="utf-8"?>
 <p:sld xmlns:a="http://schemas.openxmlformats.org/drawingml/2006/main" xmlns:r="http://schemas.openxmlformats.org/officeDocument/2006/relationships" xmlns:p="http://schemas.openxmlformats.org/presentationml/2006/main">
   <p:cSld>
     <p:spTree>
@@ -5442,7 +6002,7 @@
 </p:sld>
 </file>
 
-<file path=ppt/slides/slide17.xml><?xml version="1.0" encoding="utf-8"?>
+<file path=ppt/slides/slide19.xml><?xml version="1.0" encoding="utf-8"?>
 <p:sld xmlns:a="http://schemas.openxmlformats.org/drawingml/2006/main" xmlns:r="http://schemas.openxmlformats.org/officeDocument/2006/relationships" xmlns:p="http://schemas.openxmlformats.org/presentationml/2006/main">
   <p:cSld>
     <p:spTree>
@@ -6182,11 +6742,19 @@
           <a:p>
             <a:r>
               <a:rPr lang="en-US" dirty="0"/>
-              <a:t>Syntax - </a:t>
+              <a:t>Syntax – </a:t>
             </a:r>
             <a:r>
               <a:rPr lang="en-US" dirty="0" err="1"/>
               <a:t>Steuerung</a:t>
+            </a:r>
+            <a:r>
+              <a:rPr lang="en-US" dirty="0"/>
+              <a:t> - </a:t>
+            </a:r>
+            <a:r>
+              <a:rPr lang="en-US" dirty="0" err="1"/>
+              <a:t>Verzweigungen</a:t>
             </a:r>
             <a:endParaRPr lang="de-DE" dirty="0"/>
           </a:p>
@@ -6362,11 +6930,19 @@
           <a:p>
             <a:r>
               <a:rPr lang="en-US" dirty="0"/>
-              <a:t>Syntax - </a:t>
+              <a:t>Syntax – </a:t>
             </a:r>
             <a:r>
               <a:rPr lang="en-US" dirty="0" err="1"/>
               <a:t>Steuerung</a:t>
+            </a:r>
+            <a:r>
+              <a:rPr lang="en-US" dirty="0"/>
+              <a:t> - </a:t>
+            </a:r>
+            <a:r>
+              <a:rPr lang="en-US" dirty="0" err="1"/>
+              <a:t>Verzweigungen</a:t>
             </a:r>
             <a:endParaRPr lang="de-DE" dirty="0"/>
           </a:p>
@@ -6541,7 +7117,7 @@
           <p:cNvPr id="2" name="Title 1">
             <a:extLst>
               <a:ext uri="{FF2B5EF4-FFF2-40B4-BE49-F238E27FC236}">
-                <a16:creationId xmlns:a16="http://schemas.microsoft.com/office/drawing/2014/main" id="{E28CA3CF-0879-4A8D-944C-5254DBF4A264}"/>
+                <a16:creationId xmlns:a16="http://schemas.microsoft.com/office/drawing/2014/main" id="{2787AF2B-6A80-431C-B0D8-105393447363}"/>
               </a:ext>
             </a:extLst>
           </p:cNvPr>
@@ -6559,11 +7135,11 @@
           <a:p>
             <a:r>
               <a:rPr lang="en-US" dirty="0"/>
-              <a:t>Klassen-/</a:t>
+              <a:t>Syntax – </a:t>
             </a:r>
             <a:r>
               <a:rPr lang="en-US" dirty="0" err="1"/>
-              <a:t>Objekt-Orientierung</a:t>
+              <a:t>Steuerung</a:t>
             </a:r>
             <a:r>
               <a:rPr lang="en-US" dirty="0"/>
@@ -6571,7 +7147,7 @@
             </a:r>
             <a:r>
               <a:rPr lang="en-US" dirty="0" err="1"/>
-              <a:t>Objekte</a:t>
+              <a:t>Schleifen</a:t>
             </a:r>
             <a:endParaRPr lang="de-DE" dirty="0"/>
           </a:p>
@@ -6582,7 +7158,7 @@
           <p:cNvPr id="3" name="Content Placeholder 2">
             <a:extLst>
               <a:ext uri="{FF2B5EF4-FFF2-40B4-BE49-F238E27FC236}">
-                <a16:creationId xmlns:a16="http://schemas.microsoft.com/office/drawing/2014/main" id="{8F4A2B56-E563-4448-BD04-72ACFB91D95A}"/>
+                <a16:creationId xmlns:a16="http://schemas.microsoft.com/office/drawing/2014/main" id="{924E9E69-6BF4-41D4-BE64-679EB141A9F5}"/>
               </a:ext>
             </a:extLst>
           </p:cNvPr>
@@ -6595,135 +7171,109 @@
         </p:nvSpPr>
         <p:spPr/>
         <p:txBody>
-          <a:bodyPr/>
-          <a:lstStyle/>
-          <a:p>
-            <a:r>
-              <a:rPr lang="en-US" dirty="0"/>
-              <a:t>Klassen </a:t>
-            </a:r>
-            <a:r>
-              <a:rPr lang="en-US" dirty="0" err="1"/>
-              <a:t>sind</a:t>
-            </a:r>
-            <a:r>
-              <a:rPr lang="en-US" dirty="0"/>
-              <a:t> </a:t>
-            </a:r>
-            <a:r>
-              <a:rPr lang="en-US" dirty="0" err="1"/>
-              <a:t>Baupläne</a:t>
-            </a:r>
-            <a:r>
-              <a:rPr lang="en-US" dirty="0"/>
-              <a:t> </a:t>
-            </a:r>
-            <a:r>
-              <a:rPr lang="en-US" dirty="0" err="1"/>
-              <a:t>für</a:t>
-            </a:r>
-            <a:r>
-              <a:rPr lang="en-US" dirty="0"/>
-              <a:t> </a:t>
-            </a:r>
-            <a:r>
-              <a:rPr lang="en-US" dirty="0" err="1"/>
-              <a:t>Objekte</a:t>
-            </a:r>
-            <a:endParaRPr lang="en-US" dirty="0"/>
-          </a:p>
-          <a:p>
-            <a:r>
-              <a:rPr lang="de-DE" dirty="0"/>
-              <a:t>Neue Objekte werden mit dem </a:t>
-            </a:r>
+          <a:bodyPr>
+            <a:normAutofit/>
+          </a:bodyPr>
+          <a:lstStyle/>
+          <a:p>
+            <a:pPr marL="0" indent="0">
+              <a:buNone/>
+            </a:pPr>
             <a:r>
               <a:rPr lang="de-DE" dirty="0">
                 <a:latin typeface="Consolas" panose="020B0609020204030204" pitchFamily="49" charset="0"/>
               </a:rPr>
-              <a:t>new </a:t>
-            </a:r>
-            <a:r>
-              <a:rPr lang="de-DE" dirty="0"/>
-              <a:t>Operator erzeugt</a:t>
-            </a:r>
-          </a:p>
-          <a:p>
-            <a:r>
-              <a:rPr lang="de-DE" dirty="0"/>
-              <a:t>Dabei wird ein Konstruktor der Klasse aufgerufen.</a:t>
-            </a:r>
-          </a:p>
-          <a:p>
-            <a:endParaRPr lang="de-DE" dirty="0"/>
+              <a:t>while(condition){</a:t>
+            </a:r>
           </a:p>
           <a:p>
             <a:pPr marL="0" indent="0">
               <a:buNone/>
             </a:pPr>
             <a:r>
-              <a:rPr lang="en-US" dirty="0" err="1">
-                <a:latin typeface="Consolas" panose="020B0609020204030204" pitchFamily="49" charset="0"/>
-              </a:rPr>
-              <a:t>Klasse</a:t>
-            </a:r>
-            <a:r>
-              <a:rPr lang="en-US" dirty="0">
-                <a:latin typeface="Consolas" panose="020B0609020204030204" pitchFamily="49" charset="0"/>
-              </a:rPr>
-              <a:t> </a:t>
-            </a:r>
-            <a:r>
-              <a:rPr lang="en-US" dirty="0" err="1">
-                <a:latin typeface="Consolas" panose="020B0609020204030204" pitchFamily="49" charset="0"/>
-              </a:rPr>
-              <a:t>variablenName</a:t>
-            </a:r>
-            <a:r>
-              <a:rPr lang="en-US" dirty="0">
-                <a:latin typeface="Consolas" panose="020B0609020204030204" pitchFamily="49" charset="0"/>
-              </a:rPr>
-              <a:t> = new </a:t>
-            </a:r>
-            <a:r>
-              <a:rPr lang="en-US" dirty="0" err="1">
-                <a:latin typeface="Consolas" panose="020B0609020204030204" pitchFamily="49" charset="0"/>
-              </a:rPr>
-              <a:t>Klasse</a:t>
-            </a:r>
-            <a:r>
-              <a:rPr lang="en-US" dirty="0">
-                <a:latin typeface="Consolas" panose="020B0609020204030204" pitchFamily="49" charset="0"/>
-              </a:rPr>
-              <a:t>(parameter);</a:t>
+              <a:rPr lang="de-DE" dirty="0">
+                <a:latin typeface="Consolas" panose="020B0609020204030204" pitchFamily="49" charset="0"/>
+              </a:rPr>
+              <a:t>// Hier coden</a:t>
             </a:r>
           </a:p>
           <a:p>
             <a:pPr marL="0" indent="0">
               <a:buNone/>
             </a:pPr>
-            <a:endParaRPr lang="de-DE" dirty="0"/>
-          </a:p>
-          <a:p>
             <a:r>
               <a:rPr lang="de-DE" dirty="0">
-                <a:solidFill>
-                  <a:srgbClr val="FF0000"/>
-                </a:solidFill>
-              </a:rPr>
-              <a:t>ACHTUNG! </a:t>
-            </a:r>
-            <a:r>
-              <a:rPr lang="de-DE" dirty="0"/>
-              <a:t>Variablen halten nicht das Objekt an sich, sondern lediglich eine Referenz.</a:t>
-            </a:r>
+                <a:latin typeface="Consolas" panose="020B0609020204030204" pitchFamily="49" charset="0"/>
+              </a:rPr>
+              <a:t>} </a:t>
+            </a:r>
+          </a:p>
+          <a:p>
+            <a:pPr marL="0" indent="0">
+              <a:buNone/>
+            </a:pPr>
+            <a:endParaRPr lang="de-DE" dirty="0">
+              <a:latin typeface="Consolas" panose="020B0609020204030204" pitchFamily="49" charset="0"/>
+            </a:endParaRPr>
+          </a:p>
+          <a:p>
+            <a:pPr marL="0" indent="0">
+              <a:buNone/>
+            </a:pPr>
+            <a:r>
+              <a:rPr lang="de-DE" dirty="0">
+                <a:latin typeface="Consolas" panose="020B0609020204030204" pitchFamily="49" charset="0"/>
+              </a:rPr>
+              <a:t>for(before, condition, after each iteration){</a:t>
+            </a:r>
+          </a:p>
+          <a:p>
+            <a:pPr marL="0" indent="0">
+              <a:buNone/>
+            </a:pPr>
+            <a:r>
+              <a:rPr lang="de-DE" dirty="0">
+                <a:latin typeface="Consolas" panose="020B0609020204030204" pitchFamily="49" charset="0"/>
+              </a:rPr>
+              <a:t>// Hier coden</a:t>
+            </a:r>
+          </a:p>
+          <a:p>
+            <a:pPr marL="0" indent="0">
+              <a:buNone/>
+            </a:pPr>
+            <a:r>
+              <a:rPr lang="de-DE" dirty="0">
+                <a:latin typeface="Consolas" panose="020B0609020204030204" pitchFamily="49" charset="0"/>
+              </a:rPr>
+              <a:t>}</a:t>
+            </a:r>
+          </a:p>
+          <a:p>
+            <a:pPr marL="0" indent="0">
+              <a:buNone/>
+            </a:pPr>
+            <a:r>
+              <a:rPr lang="de-DE" dirty="0">
+                <a:latin typeface="Consolas" panose="020B0609020204030204" pitchFamily="49" charset="0"/>
+              </a:rPr>
+              <a:t>-&gt;for(Integer i = 0, i &lt; array.size(), i+=1){}</a:t>
+            </a:r>
+          </a:p>
+          <a:p>
+            <a:pPr marL="0" indent="0">
+              <a:buNone/>
+            </a:pPr>
+            <a:endParaRPr lang="de-DE" dirty="0">
+              <a:latin typeface="Consolas" panose="020B0609020204030204" pitchFamily="49" charset="0"/>
+            </a:endParaRPr>
           </a:p>
         </p:txBody>
       </p:sp>
     </p:spTree>
     <p:extLst>
       <p:ext uri="{BB962C8B-B14F-4D97-AF65-F5344CB8AC3E}">
-        <p14:creationId xmlns:p14="http://schemas.microsoft.com/office/powerpoint/2010/main" val="1693870883"/>
+        <p14:creationId xmlns:p14="http://schemas.microsoft.com/office/powerpoint/2010/main" val="3740428877"/>
       </p:ext>
     </p:extLst>
   </p:cSld>
@@ -6755,7 +7305,7 @@
           <p:cNvPr id="2" name="Title 1">
             <a:extLst>
               <a:ext uri="{FF2B5EF4-FFF2-40B4-BE49-F238E27FC236}">
-                <a16:creationId xmlns:a16="http://schemas.microsoft.com/office/drawing/2014/main" id="{AC035A81-84C6-414C-99DA-0F3DCDD4BA8E}"/>
+                <a16:creationId xmlns:a16="http://schemas.microsoft.com/office/drawing/2014/main" id="{2787AF2B-6A80-431C-B0D8-105393447363}"/>
               </a:ext>
             </a:extLst>
           </p:cNvPr>
@@ -6773,15 +7323,19 @@
           <a:p>
             <a:r>
               <a:rPr lang="en-US" dirty="0"/>
-              <a:t>Klassen-/</a:t>
+              <a:t>Syntax – </a:t>
             </a:r>
             <a:r>
               <a:rPr lang="en-US" dirty="0" err="1"/>
-              <a:t>Objekt-Orientierung</a:t>
+              <a:t>Steuerung</a:t>
             </a:r>
             <a:r>
               <a:rPr lang="en-US" dirty="0"/>
-              <a:t> - Klassen</a:t>
+              <a:t> - </a:t>
+            </a:r>
+            <a:r>
+              <a:rPr lang="en-US" dirty="0" err="1"/>
+              <a:t>Schleifen</a:t>
             </a:r>
             <a:endParaRPr lang="de-DE" dirty="0"/>
           </a:p>
@@ -6792,7 +7346,7 @@
           <p:cNvPr id="3" name="Content Placeholder 2">
             <a:extLst>
               <a:ext uri="{FF2B5EF4-FFF2-40B4-BE49-F238E27FC236}">
-                <a16:creationId xmlns:a16="http://schemas.microsoft.com/office/drawing/2014/main" id="{95D03560-AD46-4CA0-A465-3B29CC79B2DA}"/>
+                <a16:creationId xmlns:a16="http://schemas.microsoft.com/office/drawing/2014/main" id="{924E9E69-6BF4-41D4-BE64-679EB141A9F5}"/>
               </a:ext>
             </a:extLst>
           </p:cNvPr>
@@ -6805,104 +7359,85 @@
         </p:nvSpPr>
         <p:spPr/>
         <p:txBody>
-          <a:bodyPr/>
-          <a:lstStyle/>
-          <a:p>
-            <a:r>
-              <a:rPr lang="en-US" dirty="0" err="1"/>
-              <a:t>Kapseln</a:t>
-            </a:r>
-            <a:r>
-              <a:rPr lang="en-US" dirty="0"/>
+          <a:bodyPr>
+            <a:normAutofit/>
+          </a:bodyPr>
+          <a:lstStyle/>
+          <a:p>
+            <a:pPr marL="0" indent="0">
+              <a:buNone/>
+            </a:pPr>
+            <a:r>
+              <a:rPr lang="en-US" dirty="0">
+                <a:latin typeface="Consolas" panose="020B0609020204030204" pitchFamily="49" charset="0"/>
+              </a:rPr>
+              <a:t>for (</a:t>
+            </a:r>
+            <a:r>
+              <a:rPr lang="en-US" dirty="0" err="1">
+                <a:latin typeface="Consolas" panose="020B0609020204030204" pitchFamily="49" charset="0"/>
+              </a:rPr>
+              <a:t>Typ</a:t>
+            </a:r>
+            <a:r>
+              <a:rPr lang="en-US" dirty="0">
+                <a:latin typeface="Consolas" panose="020B0609020204030204" pitchFamily="49" charset="0"/>
+              </a:rPr>
               <a:t> </a:t>
             </a:r>
             <a:r>
-              <a:rPr lang="en-US" dirty="0" err="1"/>
-              <a:t>Logik</a:t>
-            </a:r>
-            <a:endParaRPr lang="en-US" dirty="0"/>
-          </a:p>
-          <a:p>
-            <a:r>
-              <a:rPr lang="en-US" dirty="0" err="1"/>
-              <a:t>Bestehen</a:t>
-            </a:r>
-            <a:r>
-              <a:rPr lang="en-US" dirty="0"/>
+              <a:rPr lang="en-US" dirty="0" err="1">
+                <a:latin typeface="Consolas" panose="020B0609020204030204" pitchFamily="49" charset="0"/>
+              </a:rPr>
+              <a:t>variablenName</a:t>
+            </a:r>
+            <a:r>
+              <a:rPr lang="en-US" dirty="0">
+                <a:latin typeface="Consolas" panose="020B0609020204030204" pitchFamily="49" charset="0"/>
+              </a:rPr>
+              <a:t> : </a:t>
+            </a:r>
+            <a:r>
+              <a:rPr lang="en-US" dirty="0" err="1">
+                <a:latin typeface="Consolas" panose="020B0609020204030204" pitchFamily="49" charset="0"/>
+              </a:rPr>
+              <a:t>arrayName</a:t>
+            </a:r>
+            <a:r>
+              <a:rPr lang="en-US" dirty="0">
+                <a:latin typeface="Consolas" panose="020B0609020204030204" pitchFamily="49" charset="0"/>
+              </a:rPr>
+              <a:t>) {</a:t>
+            </a:r>
+          </a:p>
+          <a:p>
+            <a:pPr marL="0" indent="0">
+              <a:buNone/>
+            </a:pPr>
+            <a:r>
+              <a:rPr lang="en-US" dirty="0">
+                <a:latin typeface="Consolas" panose="020B0609020204030204" pitchFamily="49" charset="0"/>
+              </a:rPr>
+              <a:t>// </a:t>
+            </a:r>
+            <a:r>
+              <a:rPr lang="en-US" dirty="0" err="1">
+                <a:latin typeface="Consolas" panose="020B0609020204030204" pitchFamily="49" charset="0"/>
+              </a:rPr>
+              <a:t>Hier</a:t>
+            </a:r>
+            <a:r>
+              <a:rPr lang="en-US" dirty="0">
+                <a:latin typeface="Consolas" panose="020B0609020204030204" pitchFamily="49" charset="0"/>
+              </a:rPr>
               <a:t> </a:t>
             </a:r>
             <a:r>
-              <a:rPr lang="en-US" dirty="0" err="1"/>
-              <a:t>aus</a:t>
-            </a:r>
-            <a:r>
-              <a:rPr lang="en-US" dirty="0"/>
-              <a:t> </a:t>
-            </a:r>
-            <a:r>
-              <a:rPr lang="en-US" dirty="0" err="1"/>
-              <a:t>Eigenschaften</a:t>
-            </a:r>
-            <a:r>
-              <a:rPr lang="en-US" dirty="0"/>
-              <a:t> (Attribute) und </a:t>
-            </a:r>
-            <a:r>
-              <a:rPr lang="en-US" dirty="0" err="1"/>
-              <a:t>Fähigkeiten</a:t>
-            </a:r>
-            <a:r>
-              <a:rPr lang="en-US" dirty="0"/>
-              <a:t> (</a:t>
-            </a:r>
-            <a:r>
-              <a:rPr lang="en-US" dirty="0" err="1"/>
-              <a:t>Methoden</a:t>
-            </a:r>
-            <a:r>
-              <a:rPr lang="en-US" dirty="0"/>
-              <a:t>)</a:t>
-            </a:r>
-          </a:p>
-          <a:p>
-            <a:pPr lvl="1"/>
-            <a:r>
-              <a:rPr lang="en-US" dirty="0"/>
-              <a:t>Pro </a:t>
-            </a:r>
-            <a:r>
-              <a:rPr lang="en-US" dirty="0" err="1"/>
-              <a:t>Objekt</a:t>
-            </a:r>
-            <a:r>
-              <a:rPr lang="en-US" dirty="0"/>
-              <a:t> </a:t>
-            </a:r>
-            <a:r>
-              <a:rPr lang="en-US" dirty="0" err="1"/>
-              <a:t>oder</a:t>
-            </a:r>
-            <a:endParaRPr lang="en-US" dirty="0"/>
-          </a:p>
-          <a:p>
-            <a:pPr lvl="1"/>
-            <a:r>
-              <a:rPr lang="en-US" dirty="0" err="1"/>
-              <a:t>Klassenübergreifend</a:t>
-            </a:r>
-            <a:r>
-              <a:rPr lang="en-US" dirty="0"/>
-              <a:t>: </a:t>
-            </a:r>
-            <a:r>
-              <a:rPr lang="en-US" dirty="0">
-                <a:latin typeface="Consolas" panose="020B0609020204030204" pitchFamily="49" charset="0"/>
-              </a:rPr>
-              <a:t>static</a:t>
-            </a:r>
-          </a:p>
-          <a:p>
-            <a:pPr lvl="1"/>
+              <a:rPr lang="en-US" dirty="0" err="1">
+                <a:latin typeface="Consolas" panose="020B0609020204030204" pitchFamily="49" charset="0"/>
+              </a:rPr>
+              <a:t>Coden</a:t>
+            </a:r>
             <a:endParaRPr lang="en-US" dirty="0">
               <a:latin typeface="Consolas" panose="020B0609020204030204" pitchFamily="49" charset="0"/>
             </a:endParaRPr>
@@ -6915,73 +7450,43 @@
               <a:rPr lang="en-US" dirty="0">
                 <a:latin typeface="Consolas" panose="020B0609020204030204" pitchFamily="49" charset="0"/>
               </a:rPr>
-              <a:t>public class Engine {</a:t>
+              <a:t>}</a:t>
             </a:r>
           </a:p>
           <a:p>
             <a:pPr marL="0" indent="0">
               <a:buNone/>
             </a:pPr>
-            <a:r>
-              <a:rPr lang="en-US" dirty="0">
-                <a:latin typeface="Consolas" panose="020B0609020204030204" pitchFamily="49" charset="0"/>
-              </a:rPr>
-              <a:t>	// </a:t>
+            <a:endParaRPr lang="en-US" dirty="0">
+              <a:latin typeface="Consolas" panose="020B0609020204030204" pitchFamily="49" charset="0"/>
+            </a:endParaRPr>
+          </a:p>
+          <a:p>
+            <a:pPr marL="0" indent="0">
+              <a:buNone/>
+            </a:pPr>
+            <a:r>
+              <a:rPr lang="en-US">
+                <a:latin typeface="Consolas" panose="020B0609020204030204" pitchFamily="49" charset="0"/>
+              </a:rPr>
+              <a:t>-&gt; For-each </a:t>
             </a:r>
             <a:r>
               <a:rPr lang="en-US" dirty="0" err="1">
                 <a:latin typeface="Consolas" panose="020B0609020204030204" pitchFamily="49" charset="0"/>
               </a:rPr>
-              <a:t>Hier</a:t>
-            </a:r>
-            <a:r>
-              <a:rPr lang="en-US" dirty="0">
-                <a:latin typeface="Consolas" panose="020B0609020204030204" pitchFamily="49" charset="0"/>
-              </a:rPr>
-              <a:t> </a:t>
-            </a:r>
-            <a:r>
-              <a:rPr lang="en-US" dirty="0" err="1">
-                <a:latin typeface="Consolas" panose="020B0609020204030204" pitchFamily="49" charset="0"/>
-              </a:rPr>
-              <a:t>kommt</a:t>
-            </a:r>
-            <a:r>
-              <a:rPr lang="en-US" dirty="0">
-                <a:latin typeface="Consolas" panose="020B0609020204030204" pitchFamily="49" charset="0"/>
-              </a:rPr>
-              <a:t> die </a:t>
-            </a:r>
-            <a:r>
-              <a:rPr lang="en-US" dirty="0" err="1">
-                <a:latin typeface="Consolas" panose="020B0609020204030204" pitchFamily="49" charset="0"/>
-              </a:rPr>
-              <a:t>Logik</a:t>
-            </a:r>
-            <a:r>
-              <a:rPr lang="en-US" dirty="0">
-                <a:latin typeface="Consolas" panose="020B0609020204030204" pitchFamily="49" charset="0"/>
-              </a:rPr>
-              <a:t> rein</a:t>
-            </a:r>
-          </a:p>
-          <a:p>
-            <a:pPr marL="0" indent="0">
-              <a:buNone/>
-            </a:pPr>
-            <a:r>
-              <a:rPr lang="en-US" dirty="0">
-                <a:latin typeface="Consolas" panose="020B0609020204030204" pitchFamily="49" charset="0"/>
-              </a:rPr>
-              <a:t>}</a:t>
-            </a:r>
+              <a:t>Scleife</a:t>
+            </a:r>
+            <a:endParaRPr lang="de-DE" dirty="0">
+              <a:latin typeface="Consolas" panose="020B0609020204030204" pitchFamily="49" charset="0"/>
+            </a:endParaRPr>
           </a:p>
         </p:txBody>
       </p:sp>
     </p:spTree>
     <p:extLst>
       <p:ext uri="{BB962C8B-B14F-4D97-AF65-F5344CB8AC3E}">
-        <p14:creationId xmlns:p14="http://schemas.microsoft.com/office/powerpoint/2010/main" val="2573320119"/>
+        <p14:creationId xmlns:p14="http://schemas.microsoft.com/office/powerpoint/2010/main" val="2890058383"/>
       </p:ext>
     </p:extLst>
   </p:cSld>
@@ -7013,7 +7518,7 @@
           <p:cNvPr id="2" name="Title 1">
             <a:extLst>
               <a:ext uri="{FF2B5EF4-FFF2-40B4-BE49-F238E27FC236}">
-                <a16:creationId xmlns:a16="http://schemas.microsoft.com/office/drawing/2014/main" id="{B0FA0676-DDB8-4556-B859-A111634CC550}"/>
+                <a16:creationId xmlns:a16="http://schemas.microsoft.com/office/drawing/2014/main" id="{E28CA3CF-0879-4A8D-944C-5254DBF4A264}"/>
               </a:ext>
             </a:extLst>
           </p:cNvPr>
@@ -7039,212 +7544,44 @@
             </a:r>
             <a:r>
               <a:rPr lang="en-US" dirty="0"/>
-              <a:t> – </a:t>
+              <a:t> - </a:t>
             </a:r>
             <a:r>
               <a:rPr lang="en-US" dirty="0" err="1"/>
-              <a:t>Methoden</a:t>
-            </a:r>
+              <a:t>Objekte</a:t>
+            </a:r>
+            <a:endParaRPr lang="de-DE" dirty="0"/>
+          </a:p>
+        </p:txBody>
+      </p:sp>
+      <p:sp>
+        <p:nvSpPr>
+          <p:cNvPr id="3" name="Content Placeholder 2">
+            <a:extLst>
+              <a:ext uri="{FF2B5EF4-FFF2-40B4-BE49-F238E27FC236}">
+                <a16:creationId xmlns:a16="http://schemas.microsoft.com/office/drawing/2014/main" id="{8F4A2B56-E563-4448-BD04-72ACFB91D95A}"/>
+              </a:ext>
+            </a:extLst>
+          </p:cNvPr>
+          <p:cNvSpPr>
+            <a:spLocks noGrp="1"/>
+          </p:cNvSpPr>
+          <p:nvPr>
+            <p:ph idx="1"/>
+          </p:nvPr>
+        </p:nvSpPr>
+        <p:spPr/>
+        <p:txBody>
+          <a:bodyPr/>
+          <a:lstStyle/>
+          <a:p>
             <a:r>
               <a:rPr lang="en-US" dirty="0"/>
-              <a:t>/Attribute</a:t>
-            </a:r>
-            <a:endParaRPr lang="de-DE" dirty="0"/>
-          </a:p>
-        </p:txBody>
-      </p:sp>
-      <p:sp>
-        <p:nvSpPr>
-          <p:cNvPr id="3" name="Content Placeholder 2">
-            <a:extLst>
-              <a:ext uri="{FF2B5EF4-FFF2-40B4-BE49-F238E27FC236}">
-                <a16:creationId xmlns:a16="http://schemas.microsoft.com/office/drawing/2014/main" id="{559D652A-7F33-47E7-AA1C-1DEAF90A72AE}"/>
-              </a:ext>
-            </a:extLst>
-          </p:cNvPr>
-          <p:cNvSpPr>
-            <a:spLocks noGrp="1"/>
-          </p:cNvSpPr>
-          <p:nvPr>
-            <p:ph idx="1"/>
-          </p:nvPr>
-        </p:nvSpPr>
-        <p:spPr/>
-        <p:txBody>
-          <a:bodyPr>
-            <a:normAutofit fontScale="92500" lnSpcReduction="20000"/>
-          </a:bodyPr>
-          <a:lstStyle/>
-          <a:p>
-            <a:pPr marL="0" indent="0">
-              <a:buNone/>
-            </a:pPr>
-            <a:r>
-              <a:rPr lang="en-US" dirty="0"/>
-              <a:t>Attribute</a:t>
-            </a:r>
-          </a:p>
-          <a:p>
-            <a:pPr marL="0" indent="0">
-              <a:buNone/>
-            </a:pPr>
-            <a:r>
-              <a:rPr lang="en-US" dirty="0" err="1">
-                <a:latin typeface="Consolas" panose="020B0609020204030204" pitchFamily="49" charset="0"/>
-              </a:rPr>
-              <a:t>sichtbarkeit</a:t>
-            </a:r>
-            <a:r>
-              <a:rPr lang="en-US" dirty="0">
-                <a:latin typeface="Consolas" panose="020B0609020204030204" pitchFamily="49" charset="0"/>
-              </a:rPr>
-              <a:t> (static) </a:t>
-            </a:r>
-            <a:r>
-              <a:rPr lang="en-US" dirty="0" err="1">
-                <a:latin typeface="Consolas" panose="020B0609020204030204" pitchFamily="49" charset="0"/>
-              </a:rPr>
-              <a:t>Typ</a:t>
-            </a:r>
-            <a:r>
-              <a:rPr lang="en-US" dirty="0">
-                <a:latin typeface="Consolas" panose="020B0609020204030204" pitchFamily="49" charset="0"/>
-              </a:rPr>
-              <a:t> Name;</a:t>
-            </a:r>
-            <a:br>
-              <a:rPr lang="en-US" dirty="0">
-                <a:latin typeface="Consolas" panose="020B0609020204030204" pitchFamily="49" charset="0"/>
-              </a:rPr>
-            </a:br>
-            <a:r>
-              <a:rPr lang="en-US" dirty="0">
-                <a:latin typeface="Consolas" panose="020B0609020204030204" pitchFamily="49" charset="0"/>
-              </a:rPr>
-              <a:t>private Integer horsepower; </a:t>
-            </a:r>
-          </a:p>
-          <a:p>
-            <a:pPr marL="0" indent="0">
-              <a:buNone/>
-            </a:pPr>
-            <a:endParaRPr lang="en-US" dirty="0">
-              <a:latin typeface="Consolas" panose="020B0609020204030204" pitchFamily="49" charset="0"/>
-            </a:endParaRPr>
-          </a:p>
-          <a:p>
-            <a:pPr marL="0" indent="0">
-              <a:buNone/>
-            </a:pPr>
+              <a:t>Klassen </a:t>
+            </a:r>
             <a:r>
               <a:rPr lang="en-US" dirty="0" err="1"/>
-              <a:t>Methoden</a:t>
-            </a:r>
-            <a:endParaRPr lang="en-US" dirty="0"/>
-          </a:p>
-          <a:p>
-            <a:pPr marL="0" indent="0">
-              <a:buNone/>
-            </a:pPr>
-            <a:r>
-              <a:rPr lang="en-US" dirty="0" err="1">
-                <a:latin typeface="Consolas" panose="020B0609020204030204" pitchFamily="49" charset="0"/>
-              </a:rPr>
-              <a:t>sichtbarkeit</a:t>
-            </a:r>
-            <a:r>
-              <a:rPr lang="en-US" dirty="0">
-                <a:latin typeface="Consolas" panose="020B0609020204030204" pitchFamily="49" charset="0"/>
-              </a:rPr>
-              <a:t> (static) </a:t>
-            </a:r>
-            <a:r>
-              <a:rPr lang="en-US" dirty="0" err="1">
-                <a:latin typeface="Consolas" panose="020B0609020204030204" pitchFamily="49" charset="0"/>
-              </a:rPr>
-              <a:t>Rückgabe-Typ</a:t>
-            </a:r>
-            <a:r>
-              <a:rPr lang="en-US" dirty="0">
-                <a:latin typeface="Consolas" panose="020B0609020204030204" pitchFamily="49" charset="0"/>
-              </a:rPr>
-              <a:t> Name(</a:t>
-            </a:r>
-            <a:r>
-              <a:rPr lang="en-US" dirty="0" err="1">
-                <a:latin typeface="Consolas" panose="020B0609020204030204" pitchFamily="49" charset="0"/>
-              </a:rPr>
-              <a:t>Parametertype</a:t>
-            </a:r>
-            <a:r>
-              <a:rPr lang="en-US" dirty="0">
-                <a:latin typeface="Consolas" panose="020B0609020204030204" pitchFamily="49" charset="0"/>
-              </a:rPr>
-              <a:t> </a:t>
-            </a:r>
-            <a:r>
-              <a:rPr lang="en-US" dirty="0" err="1">
-                <a:latin typeface="Consolas" panose="020B0609020204030204" pitchFamily="49" charset="0"/>
-              </a:rPr>
-              <a:t>parameterName</a:t>
-            </a:r>
-            <a:r>
-              <a:rPr lang="en-US" dirty="0">
-                <a:latin typeface="Consolas" panose="020B0609020204030204" pitchFamily="49" charset="0"/>
-              </a:rPr>
-              <a:t>){</a:t>
-            </a:r>
-          </a:p>
-          <a:p>
-            <a:pPr marL="0" indent="0">
-              <a:buNone/>
-            </a:pPr>
-            <a:r>
-              <a:rPr lang="en-US" dirty="0">
-                <a:latin typeface="Consolas" panose="020B0609020204030204" pitchFamily="49" charset="0"/>
-              </a:rPr>
-              <a:t>// </a:t>
-            </a:r>
-            <a:r>
-              <a:rPr lang="en-US" dirty="0" err="1">
-                <a:latin typeface="Consolas" panose="020B0609020204030204" pitchFamily="49" charset="0"/>
-              </a:rPr>
-              <a:t>Logik</a:t>
-            </a:r>
-            <a:endParaRPr lang="en-US" dirty="0">
-              <a:latin typeface="Consolas" panose="020B0609020204030204" pitchFamily="49" charset="0"/>
-            </a:endParaRPr>
-          </a:p>
-          <a:p>
-            <a:pPr marL="0" indent="0">
-              <a:buNone/>
-            </a:pPr>
-            <a:r>
-              <a:rPr lang="en-US" dirty="0">
-                <a:latin typeface="Consolas" panose="020B0609020204030204" pitchFamily="49" charset="0"/>
-              </a:rPr>
-              <a:t>}</a:t>
-            </a:r>
-            <a:br>
-              <a:rPr lang="en-US" dirty="0">
-                <a:latin typeface="Consolas" panose="020B0609020204030204" pitchFamily="49" charset="0"/>
-              </a:rPr>
-            </a:br>
-            <a:endParaRPr lang="en-US" dirty="0">
-              <a:latin typeface="Consolas" panose="020B0609020204030204" pitchFamily="49" charset="0"/>
-            </a:endParaRPr>
-          </a:p>
-          <a:p>
-            <a:pPr marL="0" indent="0">
-              <a:buNone/>
-            </a:pPr>
-            <a:r>
-              <a:rPr lang="en-US" dirty="0"/>
-              <a:t>-&gt; </a:t>
-            </a:r>
-            <a:r>
-              <a:rPr lang="en-US" dirty="0" err="1"/>
-              <a:t>Keine</a:t>
+              <a:t>sind</a:t>
             </a:r>
             <a:r>
               <a:rPr lang="en-US" dirty="0"/>
@@ -7252,36 +7589,118 @@
             </a:r>
             <a:r>
               <a:rPr lang="en-US" dirty="0" err="1"/>
-              <a:t>Rückgabe</a:t>
+              <a:t>Baupläne</a:t>
             </a:r>
             <a:r>
               <a:rPr lang="en-US" dirty="0"/>
-              <a:t>: void</a:t>
-            </a:r>
+              <a:t> </a:t>
+            </a:r>
+            <a:r>
+              <a:rPr lang="en-US" dirty="0" err="1"/>
+              <a:t>für</a:t>
+            </a:r>
+            <a:r>
+              <a:rPr lang="en-US" dirty="0"/>
+              <a:t> </a:t>
+            </a:r>
+            <a:r>
+              <a:rPr lang="en-US" dirty="0" err="1"/>
+              <a:t>Objekte</a:t>
+            </a:r>
+            <a:endParaRPr lang="en-US" dirty="0"/>
+          </a:p>
+          <a:p>
+            <a:r>
+              <a:rPr lang="de-DE" dirty="0"/>
+              <a:t>Neue Objekte werden mit dem </a:t>
+            </a:r>
+            <a:r>
+              <a:rPr lang="de-DE" dirty="0">
+                <a:latin typeface="Consolas" panose="020B0609020204030204" pitchFamily="49" charset="0"/>
+              </a:rPr>
+              <a:t>new </a:t>
+            </a:r>
+            <a:r>
+              <a:rPr lang="de-DE" dirty="0"/>
+              <a:t>Operator erzeugt</a:t>
+            </a:r>
+          </a:p>
+          <a:p>
+            <a:r>
+              <a:rPr lang="de-DE" dirty="0"/>
+              <a:t>Dabei wird ein Konstruktor der Klasse aufgerufen.</a:t>
+            </a:r>
+          </a:p>
+          <a:p>
             <a:endParaRPr lang="de-DE" dirty="0"/>
           </a:p>
           <a:p>
             <a:pPr marL="0" indent="0">
               <a:buNone/>
             </a:pPr>
-            <a:endParaRPr lang="de-DE" dirty="0">
-              <a:latin typeface="Consolas" panose="020B0609020204030204" pitchFamily="49" charset="0"/>
-            </a:endParaRPr>
+            <a:r>
+              <a:rPr lang="en-US" dirty="0" err="1">
+                <a:latin typeface="Consolas" panose="020B0609020204030204" pitchFamily="49" charset="0"/>
+              </a:rPr>
+              <a:t>Klasse</a:t>
+            </a:r>
+            <a:r>
+              <a:rPr lang="en-US" dirty="0">
+                <a:latin typeface="Consolas" panose="020B0609020204030204" pitchFamily="49" charset="0"/>
+              </a:rPr>
+              <a:t> </a:t>
+            </a:r>
+            <a:r>
+              <a:rPr lang="en-US" dirty="0" err="1">
+                <a:latin typeface="Consolas" panose="020B0609020204030204" pitchFamily="49" charset="0"/>
+              </a:rPr>
+              <a:t>variablenName</a:t>
+            </a:r>
+            <a:r>
+              <a:rPr lang="en-US" dirty="0">
+                <a:latin typeface="Consolas" panose="020B0609020204030204" pitchFamily="49" charset="0"/>
+              </a:rPr>
+              <a:t> = new </a:t>
+            </a:r>
+            <a:r>
+              <a:rPr lang="en-US" dirty="0" err="1">
+                <a:latin typeface="Consolas" panose="020B0609020204030204" pitchFamily="49" charset="0"/>
+              </a:rPr>
+              <a:t>Klasse</a:t>
+            </a:r>
+            <a:r>
+              <a:rPr lang="en-US" dirty="0">
+                <a:latin typeface="Consolas" panose="020B0609020204030204" pitchFamily="49" charset="0"/>
+              </a:rPr>
+              <a:t>(parameter);</a:t>
+            </a:r>
           </a:p>
           <a:p>
             <a:pPr marL="0" indent="0">
               <a:buNone/>
             </a:pPr>
-            <a:endParaRPr lang="de-DE" dirty="0">
-              <a:latin typeface="Consolas" panose="020B0609020204030204" pitchFamily="49" charset="0"/>
-            </a:endParaRPr>
+            <a:endParaRPr lang="de-DE" dirty="0"/>
+          </a:p>
+          <a:p>
+            <a:r>
+              <a:rPr lang="de-DE" dirty="0">
+                <a:solidFill>
+                  <a:srgbClr val="FF0000"/>
+                </a:solidFill>
+              </a:rPr>
+              <a:t>ACHTUNG! </a:t>
+            </a:r>
+            <a:r>
+              <a:rPr lang="de-DE" dirty="0"/>
+              <a:t>Variablen halten nicht das Objekt an sich, sondern lediglich eine Referenz.</a:t>
+            </a:r>
           </a:p>
         </p:txBody>
       </p:sp>
     </p:spTree>
     <p:extLst>
       <p:ext uri="{BB962C8B-B14F-4D97-AF65-F5344CB8AC3E}">
-        <p14:creationId xmlns:p14="http://schemas.microsoft.com/office/powerpoint/2010/main" val="2863131098"/>
+        <p14:creationId xmlns:p14="http://schemas.microsoft.com/office/powerpoint/2010/main" val="1693870883"/>
       </p:ext>
     </p:extLst>
   </p:cSld>

</xml_diff>

<commit_message>
added: presentation_final + quit.java
</commit_message>
<xml_diff>
--- a/CrashCourse_JAVA.pptx
+++ b/CrashCourse_JAVA.pptx
@@ -11,12 +11,12 @@
     <p:sldId id="256" r:id="rId2"/>
     <p:sldId id="257" r:id="rId3"/>
     <p:sldId id="258" r:id="rId4"/>
-    <p:sldId id="259" r:id="rId5"/>
-    <p:sldId id="260" r:id="rId6"/>
-    <p:sldId id="261" r:id="rId7"/>
-    <p:sldId id="273" r:id="rId8"/>
-    <p:sldId id="274" r:id="rId9"/>
-    <p:sldId id="262" r:id="rId10"/>
+    <p:sldId id="260" r:id="rId5"/>
+    <p:sldId id="261" r:id="rId6"/>
+    <p:sldId id="273" r:id="rId7"/>
+    <p:sldId id="274" r:id="rId8"/>
+    <p:sldId id="262" r:id="rId9"/>
+    <p:sldId id="259" r:id="rId10"/>
     <p:sldId id="263" r:id="rId11"/>
     <p:sldId id="264" r:id="rId12"/>
     <p:sldId id="265" r:id="rId13"/>
@@ -4895,6 +4895,45 @@
             </a:r>
           </a:p>
           <a:p>
+            <a:pPr lvl="1"/>
+            <a:r>
+              <a:rPr lang="en-US" dirty="0"/>
+              <a:t>Nur </a:t>
+            </a:r>
+            <a:r>
+              <a:rPr lang="en-US" dirty="0" err="1"/>
+              <a:t>wenn</a:t>
+            </a:r>
+            <a:r>
+              <a:rPr lang="en-US" dirty="0"/>
+              <a:t> </a:t>
+            </a:r>
+            <a:r>
+              <a:rPr lang="en-US" dirty="0" err="1"/>
+              <a:t>diese</a:t>
+            </a:r>
+            <a:r>
+              <a:rPr lang="en-US" dirty="0"/>
+              <a:t> public </a:t>
+            </a:r>
+            <a:r>
+              <a:rPr lang="en-US" dirty="0" err="1"/>
+              <a:t>oder</a:t>
+            </a:r>
+            <a:r>
+              <a:rPr lang="en-US" dirty="0"/>
+              <a:t> protected </a:t>
+            </a:r>
+            <a:r>
+              <a:rPr lang="en-US" dirty="0" err="1"/>
+              <a:t>sind</a:t>
+            </a:r>
+            <a:r>
+              <a:rPr lang="en-US" dirty="0"/>
+              <a:t>!</a:t>
+            </a:r>
+          </a:p>
+          <a:p>
             <a:r>
               <a:rPr lang="en-US" dirty="0" err="1"/>
               <a:t>Vererbung</a:t>
@@ -5357,6 +5396,17 @@
               <a:rPr lang="en-US" dirty="0">
                 <a:latin typeface="Consolas" panose="020B0609020204030204" pitchFamily="49" charset="0"/>
               </a:rPr>
+              <a:t>@Override</a:t>
+            </a:r>
+          </a:p>
+          <a:p>
+            <a:pPr marL="0" indent="0">
+              <a:buNone/>
+            </a:pPr>
+            <a:r>
+              <a:rPr lang="en-US" dirty="0">
+                <a:latin typeface="Consolas" panose="020B0609020204030204" pitchFamily="49" charset="0"/>
+              </a:rPr>
               <a:t>public Integer </a:t>
             </a:r>
             <a:r>
@@ -5427,7 +5477,7 @@
             </a:pPr>
             <a:r>
               <a:rPr lang="de-DE" dirty="0"/>
-              <a:t>Die Signatur ist, vereinfacht gesagt, die Kopfzeile einer Methode.</a:t>
+              <a:t>Die Signatur besteht aus Namen und Parameter einer Methode.</a:t>
             </a:r>
           </a:p>
           <a:p>
@@ -5670,8 +5720,8 @@
         </p:nvSpPr>
         <p:spPr>
           <a:xfrm rot="19815264">
-            <a:off x="-109825" y="2457097"/>
-            <a:ext cx="6930689" cy="927200"/>
+            <a:off x="-148882" y="2310028"/>
+            <a:ext cx="7523532" cy="927200"/>
           </a:xfrm>
         </p:spPr>
         <p:txBody>
@@ -5684,24 +5734,18 @@
               <a:buNone/>
             </a:pPr>
             <a:r>
-              <a:rPr lang="de-DE" sz="3200" dirty="0">
-                <a:hlinkClick r:id="rId2"/>
-              </a:rPr>
-              <a:t>https://forms.gle/</a:t>
-            </a:r>
-            <a:r>
               <a:rPr lang="de-DE" sz="3200" dirty="0"/>
-              <a:t>Ns2dhRCv96exKuz86</a:t>
+              <a:t>https://forms.gle/wz5sSWmWHKRHSPHQ6</a:t>
             </a:r>
           </a:p>
         </p:txBody>
       </p:sp>
       <p:pic>
         <p:nvPicPr>
-          <p:cNvPr id="5" name="Picture 4">
-            <a:extLst>
-              <a:ext uri="{FF2B5EF4-FFF2-40B4-BE49-F238E27FC236}">
-                <a16:creationId xmlns:a16="http://schemas.microsoft.com/office/drawing/2014/main" id="{579DE917-BA71-4A73-81A9-89539411068C}"/>
+          <p:cNvPr id="7" name="Picture 6">
+            <a:extLst>
+              <a:ext uri="{FF2B5EF4-FFF2-40B4-BE49-F238E27FC236}">
+                <a16:creationId xmlns:a16="http://schemas.microsoft.com/office/drawing/2014/main" id="{09056F1A-A01A-42E8-AE9F-A76B153A5A6A}"/>
               </a:ext>
             </a:extLst>
           </p:cNvPr>
@@ -5711,7 +5755,7 @@
           <p:nvPr/>
         </p:nvPicPr>
         <p:blipFill>
-          <a:blip r:embed="rId3">
+          <a:blip r:embed="rId2">
             <a:extLst>
               <a:ext uri="{28A0092B-C50C-407E-A947-70E740481C1C}">
                 <a14:useLocalDpi xmlns:a14="http://schemas.microsoft.com/office/drawing/2010/main" val="0"/>
@@ -5724,8 +5768,8 @@
         </p:blipFill>
         <p:spPr>
           <a:xfrm>
-            <a:off x="6594275" y="798852"/>
-            <a:ext cx="5597725" cy="5597725"/>
+            <a:off x="6866155" y="824459"/>
+            <a:ext cx="5209081" cy="5209081"/>
           </a:xfrm>
           <a:prstGeom prst="rect">
             <a:avLst/>
@@ -6467,7 +6511,7 @@
           <p:cNvPr id="2" name="Title 1">
             <a:extLst>
               <a:ext uri="{FF2B5EF4-FFF2-40B4-BE49-F238E27FC236}">
-                <a16:creationId xmlns:a16="http://schemas.microsoft.com/office/drawing/2014/main" id="{6B36B499-01D8-4E98-85FA-253FE4C4CCE5}"/>
+                <a16:creationId xmlns:a16="http://schemas.microsoft.com/office/drawing/2014/main" id="{2787AF2B-6A80-431C-B0D8-105393447363}"/>
               </a:ext>
             </a:extLst>
           </p:cNvPr>
@@ -6485,11 +6529,19 @@
           <a:p>
             <a:r>
               <a:rPr lang="en-US" dirty="0"/>
-              <a:t>Syntax - </a:t>
+              <a:t>Syntax – </a:t>
             </a:r>
             <a:r>
               <a:rPr lang="en-US" dirty="0" err="1"/>
-              <a:t>Variablen</a:t>
+              <a:t>Steuerung</a:t>
+            </a:r>
+            <a:r>
+              <a:rPr lang="en-US" dirty="0"/>
+              <a:t> - </a:t>
+            </a:r>
+            <a:r>
+              <a:rPr lang="en-US" dirty="0" err="1"/>
+              <a:t>Verzweigungen</a:t>
             </a:r>
             <a:endParaRPr lang="de-DE" dirty="0"/>
           </a:p>
@@ -6500,7 +6552,7 @@
           <p:cNvPr id="3" name="Content Placeholder 2">
             <a:extLst>
               <a:ext uri="{FF2B5EF4-FFF2-40B4-BE49-F238E27FC236}">
-                <a16:creationId xmlns:a16="http://schemas.microsoft.com/office/drawing/2014/main" id="{0AF3AC64-EC9C-4B48-8813-5E108F6F2E7F}"/>
+                <a16:creationId xmlns:a16="http://schemas.microsoft.com/office/drawing/2014/main" id="{924E9E69-6BF4-41D4-BE64-679EB141A9F5}"/>
               </a:ext>
             </a:extLst>
           </p:cNvPr>
@@ -6511,12 +6563,7 @@
             <p:ph idx="1"/>
           </p:nvPr>
         </p:nvSpPr>
-        <p:spPr>
-          <a:xfrm>
-            <a:off x="838200" y="1825624"/>
-            <a:ext cx="10515600" cy="4667251"/>
-          </a:xfrm>
-        </p:spPr>
+        <p:spPr/>
         <p:txBody>
           <a:bodyPr>
             <a:normAutofit/>
@@ -6527,51 +6574,10 @@
               <a:buNone/>
             </a:pPr>
             <a:r>
-              <a:rPr lang="en-US" sz="3200" dirty="0" err="1">
-                <a:latin typeface="Consolas" panose="020B0609020204030204" pitchFamily="49" charset="0"/>
-              </a:rPr>
-              <a:t>Klasse</a:t>
-            </a:r>
-            <a:r>
-              <a:rPr lang="en-US" sz="3200" dirty="0">
-                <a:latin typeface="Consolas" panose="020B0609020204030204" pitchFamily="49" charset="0"/>
-              </a:rPr>
-              <a:t> </a:t>
-            </a:r>
-            <a:r>
-              <a:rPr lang="en-US" sz="3200" dirty="0" err="1">
-                <a:latin typeface="Consolas" panose="020B0609020204030204" pitchFamily="49" charset="0"/>
-              </a:rPr>
-              <a:t>variablenName</a:t>
-            </a:r>
-            <a:r>
-              <a:rPr lang="en-US" sz="3200" dirty="0">
-                <a:latin typeface="Consolas" panose="020B0609020204030204" pitchFamily="49" charset="0"/>
-              </a:rPr>
-              <a:t> = new </a:t>
-            </a:r>
-            <a:r>
-              <a:rPr lang="en-US" sz="3200" dirty="0" err="1">
-                <a:latin typeface="Consolas" panose="020B0609020204030204" pitchFamily="49" charset="0"/>
-              </a:rPr>
-              <a:t>Klasse</a:t>
-            </a:r>
-            <a:r>
-              <a:rPr lang="en-US" sz="3200" dirty="0">
-                <a:latin typeface="Consolas" panose="020B0609020204030204" pitchFamily="49" charset="0"/>
-              </a:rPr>
-              <a:t>(parameter);</a:t>
-            </a:r>
-          </a:p>
-          <a:p>
-            <a:pPr marL="0" indent="0" algn="ctr">
-              <a:buNone/>
-            </a:pPr>
-            <a:r>
-              <a:rPr lang="en-US" sz="3200" dirty="0">
-                <a:latin typeface="Consolas" panose="020B0609020204030204" pitchFamily="49" charset="0"/>
-              </a:rPr>
-              <a:t>------------------------------</a:t>
+              <a:rPr lang="de-DE" dirty="0">
+                <a:latin typeface="Consolas" panose="020B0609020204030204" pitchFamily="49" charset="0"/>
+              </a:rPr>
+              <a:t>if (condition) {</a:t>
             </a:r>
           </a:p>
           <a:p>
@@ -6579,40 +6585,25 @@
               <a:buNone/>
             </a:pPr>
             <a:r>
-              <a:rPr lang="en-US" sz="3200" dirty="0" err="1">
-                <a:latin typeface="Consolas" panose="020B0609020204030204" pitchFamily="49" charset="0"/>
-              </a:rPr>
-              <a:t>Klasse</a:t>
-            </a:r>
-            <a:r>
-              <a:rPr lang="en-US" sz="3200" dirty="0">
-                <a:latin typeface="Consolas" panose="020B0609020204030204" pitchFamily="49" charset="0"/>
-              </a:rPr>
-              <a:t> </a:t>
-            </a:r>
-            <a:r>
-              <a:rPr lang="en-US" sz="3200" dirty="0" err="1">
-                <a:latin typeface="Consolas" panose="020B0609020204030204" pitchFamily="49" charset="0"/>
-              </a:rPr>
-              <a:t>variablenName</a:t>
-            </a:r>
-            <a:r>
-              <a:rPr lang="en-US" sz="3200" dirty="0">
-                <a:latin typeface="Consolas" panose="020B0609020204030204" pitchFamily="49" charset="0"/>
-              </a:rPr>
-              <a:t>; //</a:t>
-            </a:r>
-            <a:r>
-              <a:rPr lang="en-US" sz="3200" dirty="0" err="1">
-                <a:latin typeface="Consolas" panose="020B0609020204030204" pitchFamily="49" charset="0"/>
-              </a:rPr>
-              <a:t>Deklaration</a:t>
-            </a:r>
-            <a:r>
-              <a:rPr lang="en-US" sz="3200" dirty="0">
-                <a:latin typeface="Consolas" panose="020B0609020204030204" pitchFamily="49" charset="0"/>
-              </a:rPr>
-              <a:t> </a:t>
+              <a:rPr lang="de-DE" dirty="0">
+                <a:latin typeface="Consolas" panose="020B0609020204030204" pitchFamily="49" charset="0"/>
+              </a:rPr>
+              <a:t>// Code wird ausgeführt wenn condition </a:t>
+            </a:r>
+            <a:r>
+              <a:rPr lang="de-DE" dirty="0">
+                <a:solidFill>
+                  <a:srgbClr val="00B050"/>
+                </a:solidFill>
+                <a:latin typeface="Consolas" panose="020B0609020204030204" pitchFamily="49" charset="0"/>
+              </a:rPr>
+              <a:t>wahr</a:t>
+            </a:r>
+            <a:r>
+              <a:rPr lang="de-DE" dirty="0">
+                <a:latin typeface="Consolas" panose="020B0609020204030204" pitchFamily="49" charset="0"/>
+              </a:rPr>
+              <a:t> ist</a:t>
             </a:r>
           </a:p>
           <a:p>
@@ -6620,34 +6611,10 @@
               <a:buNone/>
             </a:pPr>
             <a:r>
-              <a:rPr lang="en-US" sz="3200" i="1" dirty="0"/>
-              <a:t>-&gt; </a:t>
-            </a:r>
-            <a:r>
-              <a:rPr lang="en-US" sz="3200" i="1" dirty="0" err="1"/>
-              <a:t>Welchen</a:t>
-            </a:r>
-            <a:r>
-              <a:rPr lang="en-US" sz="3200" i="1" dirty="0"/>
-              <a:t> wert hat </a:t>
-            </a:r>
-            <a:r>
-              <a:rPr lang="en-US" sz="3200" i="1" dirty="0" err="1">
-                <a:latin typeface="Consolas" panose="020B0609020204030204" pitchFamily="49" charset="0"/>
-              </a:rPr>
-              <a:t>variablenName</a:t>
-            </a:r>
-            <a:r>
-              <a:rPr lang="en-US" sz="3200" i="1" dirty="0"/>
-              <a:t> </a:t>
-            </a:r>
-            <a:r>
-              <a:rPr lang="en-US" sz="3200" i="1" dirty="0" err="1"/>
-              <a:t>hier</a:t>
-            </a:r>
-            <a:r>
-              <a:rPr lang="en-US" sz="3200" i="1" dirty="0"/>
-              <a:t>?</a:t>
+              <a:rPr lang="de-DE" dirty="0">
+                <a:latin typeface="Consolas" panose="020B0609020204030204" pitchFamily="49" charset="0"/>
+              </a:rPr>
+              <a:t>} else {</a:t>
             </a:r>
           </a:p>
           <a:p>
@@ -6655,35 +6622,43 @@
               <a:buNone/>
             </a:pPr>
             <a:r>
-              <a:rPr lang="en-US" sz="3200" dirty="0" err="1">
-                <a:latin typeface="Consolas" panose="020B0609020204030204" pitchFamily="49" charset="0"/>
-              </a:rPr>
-              <a:t>variablenName</a:t>
-            </a:r>
-            <a:r>
-              <a:rPr lang="en-US" sz="3200" dirty="0">
-                <a:latin typeface="Consolas" panose="020B0609020204030204" pitchFamily="49" charset="0"/>
-              </a:rPr>
-              <a:t> = new </a:t>
-            </a:r>
-            <a:r>
-              <a:rPr lang="en-US" sz="3200" dirty="0" err="1">
-                <a:latin typeface="Consolas" panose="020B0609020204030204" pitchFamily="49" charset="0"/>
-              </a:rPr>
-              <a:t>Klasse</a:t>
-            </a:r>
-            <a:r>
-              <a:rPr lang="en-US" sz="3200" dirty="0">
-                <a:latin typeface="Consolas" panose="020B0609020204030204" pitchFamily="49" charset="0"/>
-              </a:rPr>
-              <a:t>(parameter); //Init</a:t>
+              <a:rPr lang="de-DE" dirty="0">
+                <a:latin typeface="Consolas" panose="020B0609020204030204" pitchFamily="49" charset="0"/>
+              </a:rPr>
+              <a:t>// Code wird ausgeführt wenn condition </a:t>
+            </a:r>
+            <a:r>
+              <a:rPr lang="de-DE" dirty="0">
+                <a:solidFill>
+                  <a:srgbClr val="FF0000"/>
+                </a:solidFill>
+                <a:latin typeface="Consolas" panose="020B0609020204030204" pitchFamily="49" charset="0"/>
+              </a:rPr>
+              <a:t>falsch</a:t>
+            </a:r>
+            <a:r>
+              <a:rPr lang="de-DE" dirty="0">
+                <a:latin typeface="Consolas" panose="020B0609020204030204" pitchFamily="49" charset="0"/>
+              </a:rPr>
+              <a:t> ist</a:t>
             </a:r>
           </a:p>
           <a:p>
             <a:pPr marL="0" indent="0">
               <a:buNone/>
             </a:pPr>
-            <a:endParaRPr lang="de-DE" sz="3200" dirty="0">
+            <a:r>
+              <a:rPr lang="de-DE" dirty="0">
+                <a:latin typeface="Consolas" panose="020B0609020204030204" pitchFamily="49" charset="0"/>
+              </a:rPr>
+              <a:t>}</a:t>
+            </a:r>
+            <a:br>
+              <a:rPr lang="de-DE" dirty="0">
+                <a:latin typeface="Consolas" panose="020B0609020204030204" pitchFamily="49" charset="0"/>
+              </a:rPr>
+            </a:br>
+            <a:endParaRPr lang="de-DE" dirty="0">
               <a:latin typeface="Consolas" panose="020B0609020204030204" pitchFamily="49" charset="0"/>
             </a:endParaRPr>
           </a:p>
@@ -6692,7 +6667,7 @@
     </p:spTree>
     <p:extLst>
       <p:ext uri="{BB962C8B-B14F-4D97-AF65-F5344CB8AC3E}">
-        <p14:creationId xmlns:p14="http://schemas.microsoft.com/office/powerpoint/2010/main" val="248704395"/>
+        <p14:creationId xmlns:p14="http://schemas.microsoft.com/office/powerpoint/2010/main" val="375158907"/>
       </p:ext>
     </p:extLst>
   </p:cSld>
@@ -6779,7 +6754,7 @@
         <p:spPr/>
         <p:txBody>
           <a:bodyPr>
-            <a:normAutofit/>
+            <a:normAutofit fontScale="92500" lnSpcReduction="20000"/>
           </a:bodyPr>
           <a:lstStyle/>
           <a:p>
@@ -6790,7 +6765,7 @@
               <a:rPr lang="de-DE" dirty="0">
                 <a:latin typeface="Consolas" panose="020B0609020204030204" pitchFamily="49" charset="0"/>
               </a:rPr>
-              <a:t>if (condition) {</a:t>
+              <a:t>switch(i){</a:t>
             </a:r>
           </a:p>
           <a:p>
@@ -6801,22 +6776,29 @@
               <a:rPr lang="de-DE" dirty="0">
                 <a:latin typeface="Consolas" panose="020B0609020204030204" pitchFamily="49" charset="0"/>
               </a:rPr>
-              <a:t>// Code wird ausgeführt wenn condition </a:t>
-            </a:r>
+              <a:t>case 0:</a:t>
+            </a:r>
+          </a:p>
+          <a:p>
+            <a:pPr marL="0" indent="0">
+              <a:buNone/>
+            </a:pPr>
             <a:r>
               <a:rPr lang="de-DE" dirty="0">
-                <a:solidFill>
-                  <a:srgbClr val="00B050"/>
-                </a:solidFill>
-                <a:latin typeface="Consolas" panose="020B0609020204030204" pitchFamily="49" charset="0"/>
-              </a:rPr>
-              <a:t>wahr</a:t>
-            </a:r>
+                <a:latin typeface="Consolas" panose="020B0609020204030204" pitchFamily="49" charset="0"/>
+              </a:rPr>
+              <a:t>	System.out.println("i ist null");</a:t>
+            </a:r>
+          </a:p>
+          <a:p>
+            <a:pPr marL="0" indent="0">
+              <a:buNone/>
+            </a:pPr>
             <a:r>
               <a:rPr lang="de-DE" dirty="0">
                 <a:latin typeface="Consolas" panose="020B0609020204030204" pitchFamily="49" charset="0"/>
               </a:rPr>
-              <a:t> ist</a:t>
+              <a:t>	break;</a:t>
             </a:r>
           </a:p>
           <a:p>
@@ -6827,7 +6809,7 @@
               <a:rPr lang="de-DE" dirty="0">
                 <a:latin typeface="Consolas" panose="020B0609020204030204" pitchFamily="49" charset="0"/>
               </a:rPr>
-              <a:t>} else {</a:t>
+              <a:t>case 1:</a:t>
             </a:r>
           </a:p>
           <a:p>
@@ -6838,22 +6820,29 @@
               <a:rPr lang="de-DE" dirty="0">
                 <a:latin typeface="Consolas" panose="020B0609020204030204" pitchFamily="49" charset="0"/>
               </a:rPr>
-              <a:t>// Code wird ausgeführt wenn condition </a:t>
-            </a:r>
+              <a:t>	System.out.println("i ist eins");</a:t>
+            </a:r>
+          </a:p>
+          <a:p>
+            <a:pPr marL="0" indent="0">
+              <a:buNone/>
+            </a:pPr>
             <a:r>
               <a:rPr lang="de-DE" dirty="0">
-                <a:solidFill>
-                  <a:srgbClr val="FF0000"/>
-                </a:solidFill>
-                <a:latin typeface="Consolas" panose="020B0609020204030204" pitchFamily="49" charset="0"/>
-              </a:rPr>
-              <a:t>falsch</a:t>
-            </a:r>
+                <a:latin typeface="Consolas" panose="020B0609020204030204" pitchFamily="49" charset="0"/>
+              </a:rPr>
+              <a:t>	break;</a:t>
+            </a:r>
+          </a:p>
+          <a:p>
+            <a:pPr marL="0" indent="0">
+              <a:buNone/>
+            </a:pPr>
             <a:r>
               <a:rPr lang="de-DE" dirty="0">
                 <a:latin typeface="Consolas" panose="020B0609020204030204" pitchFamily="49" charset="0"/>
               </a:rPr>
-              <a:t> ist</a:t>
+              <a:t>case default:</a:t>
             </a:r>
           </a:p>
           <a:p>
@@ -6864,23 +6853,26 @@
               <a:rPr lang="de-DE" dirty="0">
                 <a:latin typeface="Consolas" panose="020B0609020204030204" pitchFamily="49" charset="0"/>
               </a:rPr>
-              <a:t>}</a:t>
-            </a:r>
-            <a:br>
+              <a:t>	System.out.println("i ist nicht 0 oder 1");</a:t>
+            </a:r>
+          </a:p>
+          <a:p>
+            <a:pPr marL="0" indent="0">
+              <a:buNone/>
+            </a:pPr>
+            <a:r>
               <a:rPr lang="de-DE" dirty="0">
                 <a:latin typeface="Consolas" panose="020B0609020204030204" pitchFamily="49" charset="0"/>
               </a:rPr>
-            </a:br>
-            <a:endParaRPr lang="de-DE" dirty="0">
-              <a:latin typeface="Consolas" panose="020B0609020204030204" pitchFamily="49" charset="0"/>
-            </a:endParaRPr>
+              <a:t>} </a:t>
+            </a:r>
           </a:p>
         </p:txBody>
       </p:sp>
     </p:spTree>
     <p:extLst>
       <p:ext uri="{BB962C8B-B14F-4D97-AF65-F5344CB8AC3E}">
-        <p14:creationId xmlns:p14="http://schemas.microsoft.com/office/powerpoint/2010/main" val="375158907"/>
+        <p14:creationId xmlns:p14="http://schemas.microsoft.com/office/powerpoint/2010/main" val="3243129033"/>
       </p:ext>
     </p:extLst>
   </p:cSld>
@@ -6942,7 +6934,7 @@
             </a:r>
             <a:r>
               <a:rPr lang="en-US" dirty="0" err="1"/>
-              <a:t>Verzweigungen</a:t>
+              <a:t>Schleifen</a:t>
             </a:r>
             <a:endParaRPr lang="de-DE" dirty="0"/>
           </a:p>
@@ -6967,7 +6959,7 @@
         <p:spPr/>
         <p:txBody>
           <a:bodyPr>
-            <a:normAutofit fontScale="92500" lnSpcReduction="20000"/>
+            <a:normAutofit/>
           </a:bodyPr>
           <a:lstStyle/>
           <a:p>
@@ -6978,7 +6970,7 @@
               <a:rPr lang="de-DE" dirty="0">
                 <a:latin typeface="Consolas" panose="020B0609020204030204" pitchFamily="49" charset="0"/>
               </a:rPr>
-              <a:t>switch(i){</a:t>
+              <a:t>while(condition){</a:t>
             </a:r>
           </a:p>
           <a:p>
@@ -6989,7 +6981,7 @@
               <a:rPr lang="de-DE" dirty="0">
                 <a:latin typeface="Consolas" panose="020B0609020204030204" pitchFamily="49" charset="0"/>
               </a:rPr>
-              <a:t>case 0:</a:t>
+              <a:t>// Hier coden</a:t>
             </a:r>
           </a:p>
           <a:p>
@@ -7000,18 +6992,26 @@
               <a:rPr lang="de-DE" dirty="0">
                 <a:latin typeface="Consolas" panose="020B0609020204030204" pitchFamily="49" charset="0"/>
               </a:rPr>
-              <a:t>	System.out.println("i ist null");</a:t>
+              <a:t>} </a:t>
             </a:r>
           </a:p>
           <a:p>
             <a:pPr marL="0" indent="0">
               <a:buNone/>
             </a:pPr>
+            <a:endParaRPr lang="de-DE" dirty="0">
+              <a:latin typeface="Consolas" panose="020B0609020204030204" pitchFamily="49" charset="0"/>
+            </a:endParaRPr>
+          </a:p>
+          <a:p>
+            <a:pPr marL="0" indent="0">
+              <a:buNone/>
+            </a:pPr>
             <a:r>
               <a:rPr lang="de-DE" dirty="0">
                 <a:latin typeface="Consolas" panose="020B0609020204030204" pitchFamily="49" charset="0"/>
               </a:rPr>
-              <a:t>	break;</a:t>
+              <a:t>for(before, condition, after each iteration){</a:t>
             </a:r>
           </a:p>
           <a:p>
@@ -7022,7 +7022,7 @@
               <a:rPr lang="de-DE" dirty="0">
                 <a:latin typeface="Consolas" panose="020B0609020204030204" pitchFamily="49" charset="0"/>
               </a:rPr>
-              <a:t>case 1:</a:t>
+              <a:t>// Hier coden</a:t>
             </a:r>
           </a:p>
           <a:p>
@@ -7033,7 +7033,7 @@
               <a:rPr lang="de-DE" dirty="0">
                 <a:latin typeface="Consolas" panose="020B0609020204030204" pitchFamily="49" charset="0"/>
               </a:rPr>
-              <a:t>	System.out.println("i ist eins");</a:t>
+              <a:t>}</a:t>
             </a:r>
           </a:p>
           <a:p>
@@ -7044,48 +7044,23 @@
               <a:rPr lang="de-DE" dirty="0">
                 <a:latin typeface="Consolas" panose="020B0609020204030204" pitchFamily="49" charset="0"/>
               </a:rPr>
-              <a:t>	break;</a:t>
+              <a:t>-&gt;for(Integer i = 0, i &lt; array.size(), i+=1){}</a:t>
             </a:r>
           </a:p>
           <a:p>
             <a:pPr marL="0" indent="0">
               <a:buNone/>
             </a:pPr>
-            <a:r>
-              <a:rPr lang="de-DE" dirty="0">
-                <a:latin typeface="Consolas" panose="020B0609020204030204" pitchFamily="49" charset="0"/>
-              </a:rPr>
-              <a:t>case default:</a:t>
-            </a:r>
-          </a:p>
-          <a:p>
-            <a:pPr marL="0" indent="0">
-              <a:buNone/>
-            </a:pPr>
-            <a:r>
-              <a:rPr lang="de-DE" dirty="0">
-                <a:latin typeface="Consolas" panose="020B0609020204030204" pitchFamily="49" charset="0"/>
-              </a:rPr>
-              <a:t>	System.out.println("i ist nicht 0 oder 1");</a:t>
-            </a:r>
-          </a:p>
-          <a:p>
-            <a:pPr marL="0" indent="0">
-              <a:buNone/>
-            </a:pPr>
-            <a:r>
-              <a:rPr lang="de-DE" dirty="0">
-                <a:latin typeface="Consolas" panose="020B0609020204030204" pitchFamily="49" charset="0"/>
-              </a:rPr>
-              <a:t>} </a:t>
-            </a:r>
+            <a:endParaRPr lang="de-DE" dirty="0">
+              <a:latin typeface="Consolas" panose="020B0609020204030204" pitchFamily="49" charset="0"/>
+            </a:endParaRPr>
           </a:p>
         </p:txBody>
       </p:sp>
     </p:spTree>
     <p:extLst>
       <p:ext uri="{BB962C8B-B14F-4D97-AF65-F5344CB8AC3E}">
-        <p14:creationId xmlns:p14="http://schemas.microsoft.com/office/powerpoint/2010/main" val="3243129033"/>
+        <p14:creationId xmlns:p14="http://schemas.microsoft.com/office/powerpoint/2010/main" val="3740428877"/>
       </p:ext>
     </p:extLst>
   </p:cSld>
@@ -7180,10 +7155,46 @@
               <a:buNone/>
             </a:pPr>
             <a:r>
-              <a:rPr lang="de-DE" dirty="0">
-                <a:latin typeface="Consolas" panose="020B0609020204030204" pitchFamily="49" charset="0"/>
-              </a:rPr>
-              <a:t>while(condition){</a:t>
+              <a:rPr lang="en-US" dirty="0">
+                <a:latin typeface="Consolas" panose="020B0609020204030204" pitchFamily="49" charset="0"/>
+              </a:rPr>
+              <a:t>for (</a:t>
+            </a:r>
+            <a:r>
+              <a:rPr lang="en-US" dirty="0" err="1">
+                <a:latin typeface="Consolas" panose="020B0609020204030204" pitchFamily="49" charset="0"/>
+              </a:rPr>
+              <a:t>Typ</a:t>
+            </a:r>
+            <a:r>
+              <a:rPr lang="en-US" dirty="0">
+                <a:latin typeface="Consolas" panose="020B0609020204030204" pitchFamily="49" charset="0"/>
+              </a:rPr>
+              <a:t> </a:t>
+            </a:r>
+            <a:r>
+              <a:rPr lang="en-US" dirty="0" err="1">
+                <a:latin typeface="Consolas" panose="020B0609020204030204" pitchFamily="49" charset="0"/>
+              </a:rPr>
+              <a:t>variablenName</a:t>
+            </a:r>
+            <a:r>
+              <a:rPr lang="en-US" dirty="0">
+                <a:latin typeface="Consolas" panose="020B0609020204030204" pitchFamily="49" charset="0"/>
+              </a:rPr>
+              <a:t> : </a:t>
+            </a:r>
+            <a:r>
+              <a:rPr lang="en-US" dirty="0" err="1">
+                <a:latin typeface="Consolas" panose="020B0609020204030204" pitchFamily="49" charset="0"/>
+              </a:rPr>
+              <a:t>arrayName</a:t>
+            </a:r>
+            <a:r>
+              <a:rPr lang="en-US" dirty="0">
+                <a:latin typeface="Consolas" panose="020B0609020204030204" pitchFamily="49" charset="0"/>
+              </a:rPr>
+              <a:t>) {</a:t>
             </a:r>
           </a:p>
           <a:p>
@@ -7191,89 +7202,78 @@
               <a:buNone/>
             </a:pPr>
             <a:r>
-              <a:rPr lang="de-DE" dirty="0">
-                <a:latin typeface="Consolas" panose="020B0609020204030204" pitchFamily="49" charset="0"/>
-              </a:rPr>
-              <a:t>// Hier coden</a:t>
-            </a:r>
+              <a:rPr lang="en-US" dirty="0">
+                <a:latin typeface="Consolas" panose="020B0609020204030204" pitchFamily="49" charset="0"/>
+              </a:rPr>
+              <a:t>// </a:t>
+            </a:r>
+            <a:r>
+              <a:rPr lang="en-US" dirty="0" err="1">
+                <a:latin typeface="Consolas" panose="020B0609020204030204" pitchFamily="49" charset="0"/>
+              </a:rPr>
+              <a:t>Hier</a:t>
+            </a:r>
+            <a:r>
+              <a:rPr lang="en-US" dirty="0">
+                <a:latin typeface="Consolas" panose="020B0609020204030204" pitchFamily="49" charset="0"/>
+              </a:rPr>
+              <a:t> </a:t>
+            </a:r>
+            <a:r>
+              <a:rPr lang="en-US" dirty="0" err="1">
+                <a:latin typeface="Consolas" panose="020B0609020204030204" pitchFamily="49" charset="0"/>
+              </a:rPr>
+              <a:t>Coden</a:t>
+            </a:r>
+            <a:endParaRPr lang="en-US" dirty="0">
+              <a:latin typeface="Consolas" panose="020B0609020204030204" pitchFamily="49" charset="0"/>
+            </a:endParaRPr>
           </a:p>
           <a:p>
             <a:pPr marL="0" indent="0">
               <a:buNone/>
             </a:pPr>
             <a:r>
-              <a:rPr lang="de-DE" dirty="0">
-                <a:latin typeface="Consolas" panose="020B0609020204030204" pitchFamily="49" charset="0"/>
-              </a:rPr>
-              <a:t>} </a:t>
+              <a:rPr lang="en-US" dirty="0">
+                <a:latin typeface="Consolas" panose="020B0609020204030204" pitchFamily="49" charset="0"/>
+              </a:rPr>
+              <a:t>}</a:t>
             </a:r>
           </a:p>
           <a:p>
             <a:pPr marL="0" indent="0">
               <a:buNone/>
             </a:pPr>
+            <a:endParaRPr lang="en-US" dirty="0">
+              <a:latin typeface="Consolas" panose="020B0609020204030204" pitchFamily="49" charset="0"/>
+            </a:endParaRPr>
+          </a:p>
+          <a:p>
+            <a:pPr marL="0" indent="0">
+              <a:buNone/>
+            </a:pPr>
+            <a:r>
+              <a:rPr lang="en-US">
+                <a:latin typeface="Consolas" panose="020B0609020204030204" pitchFamily="49" charset="0"/>
+              </a:rPr>
+              <a:t>-&gt; For-each </a:t>
+            </a:r>
+            <a:r>
+              <a:rPr lang="en-US" dirty="0" err="1">
+                <a:latin typeface="Consolas" panose="020B0609020204030204" pitchFamily="49" charset="0"/>
+              </a:rPr>
+              <a:t>Scleife</a:t>
+            </a:r>
             <a:endParaRPr lang="de-DE" dirty="0">
               <a:latin typeface="Consolas" panose="020B0609020204030204" pitchFamily="49" charset="0"/>
             </a:endParaRPr>
           </a:p>
-          <a:p>
-            <a:pPr marL="0" indent="0">
-              <a:buNone/>
-            </a:pPr>
-            <a:r>
-              <a:rPr lang="de-DE" dirty="0">
-                <a:latin typeface="Consolas" panose="020B0609020204030204" pitchFamily="49" charset="0"/>
-              </a:rPr>
-              <a:t>for(before, condition, after each iteration){</a:t>
-            </a:r>
-          </a:p>
-          <a:p>
-            <a:pPr marL="0" indent="0">
-              <a:buNone/>
-            </a:pPr>
-            <a:r>
-              <a:rPr lang="de-DE" dirty="0">
-                <a:latin typeface="Consolas" panose="020B0609020204030204" pitchFamily="49" charset="0"/>
-              </a:rPr>
-              <a:t>// Hier coden</a:t>
-            </a:r>
-          </a:p>
-          <a:p>
-            <a:pPr marL="0" indent="0">
-              <a:buNone/>
-            </a:pPr>
-            <a:r>
-              <a:rPr lang="de-DE" dirty="0">
-                <a:latin typeface="Consolas" panose="020B0609020204030204" pitchFamily="49" charset="0"/>
-              </a:rPr>
-              <a:t>}</a:t>
-            </a:r>
-          </a:p>
-          <a:p>
-            <a:pPr marL="0" indent="0">
-              <a:buNone/>
-            </a:pPr>
-            <a:r>
-              <a:rPr lang="de-DE" dirty="0">
-                <a:latin typeface="Consolas" panose="020B0609020204030204" pitchFamily="49" charset="0"/>
-              </a:rPr>
-              <a:t>-&gt;for(Integer i = 0, i &lt; array.size(), i+=1){}</a:t>
-            </a:r>
-          </a:p>
-          <a:p>
-            <a:pPr marL="0" indent="0">
-              <a:buNone/>
-            </a:pPr>
-            <a:endParaRPr lang="de-DE" dirty="0">
-              <a:latin typeface="Consolas" panose="020B0609020204030204" pitchFamily="49" charset="0"/>
-            </a:endParaRPr>
-          </a:p>
         </p:txBody>
       </p:sp>
     </p:spTree>
     <p:extLst>
       <p:ext uri="{BB962C8B-B14F-4D97-AF65-F5344CB8AC3E}">
-        <p14:creationId xmlns:p14="http://schemas.microsoft.com/office/powerpoint/2010/main" val="3740428877"/>
+        <p14:creationId xmlns:p14="http://schemas.microsoft.com/office/powerpoint/2010/main" val="2890058383"/>
       </p:ext>
     </p:extLst>
   </p:cSld>
@@ -7305,7 +7305,7 @@
           <p:cNvPr id="2" name="Title 1">
             <a:extLst>
               <a:ext uri="{FF2B5EF4-FFF2-40B4-BE49-F238E27FC236}">
-                <a16:creationId xmlns:a16="http://schemas.microsoft.com/office/drawing/2014/main" id="{2787AF2B-6A80-431C-B0D8-105393447363}"/>
+                <a16:creationId xmlns:a16="http://schemas.microsoft.com/office/drawing/2014/main" id="{E28CA3CF-0879-4A8D-944C-5254DBF4A264}"/>
               </a:ext>
             </a:extLst>
           </p:cNvPr>
@@ -7323,11 +7323,11 @@
           <a:p>
             <a:r>
               <a:rPr lang="en-US" dirty="0"/>
-              <a:t>Syntax – </a:t>
+              <a:t>Klassen-/</a:t>
             </a:r>
             <a:r>
               <a:rPr lang="en-US" dirty="0" err="1"/>
-              <a:t>Steuerung</a:t>
+              <a:t>Objekt-Orientierung</a:t>
             </a:r>
             <a:r>
               <a:rPr lang="en-US" dirty="0"/>
@@ -7335,7 +7335,7 @@
             </a:r>
             <a:r>
               <a:rPr lang="en-US" dirty="0" err="1"/>
-              <a:t>Schleifen</a:t>
+              <a:t>Objekte</a:t>
             </a:r>
             <a:endParaRPr lang="de-DE" dirty="0"/>
           </a:p>
@@ -7346,7 +7346,7 @@
           <p:cNvPr id="3" name="Content Placeholder 2">
             <a:extLst>
               <a:ext uri="{FF2B5EF4-FFF2-40B4-BE49-F238E27FC236}">
-                <a16:creationId xmlns:a16="http://schemas.microsoft.com/office/drawing/2014/main" id="{924E9E69-6BF4-41D4-BE64-679EB141A9F5}"/>
+                <a16:creationId xmlns:a16="http://schemas.microsoft.com/office/drawing/2014/main" id="{8F4A2B56-E563-4448-BD04-72ACFB91D95A}"/>
               </a:ext>
             </a:extLst>
           </p:cNvPr>
@@ -7359,134 +7359,135 @@
         </p:nvSpPr>
         <p:spPr/>
         <p:txBody>
-          <a:bodyPr>
-            <a:normAutofit/>
-          </a:bodyPr>
-          <a:lstStyle/>
+          <a:bodyPr/>
+          <a:lstStyle/>
+          <a:p>
+            <a:r>
+              <a:rPr lang="en-US" dirty="0"/>
+              <a:t>Klassen </a:t>
+            </a:r>
+            <a:r>
+              <a:rPr lang="en-US" dirty="0" err="1"/>
+              <a:t>sind</a:t>
+            </a:r>
+            <a:r>
+              <a:rPr lang="en-US" dirty="0"/>
+              <a:t> </a:t>
+            </a:r>
+            <a:r>
+              <a:rPr lang="en-US" dirty="0" err="1"/>
+              <a:t>Baupläne</a:t>
+            </a:r>
+            <a:r>
+              <a:rPr lang="en-US" dirty="0"/>
+              <a:t> </a:t>
+            </a:r>
+            <a:r>
+              <a:rPr lang="en-US" dirty="0" err="1"/>
+              <a:t>für</a:t>
+            </a:r>
+            <a:r>
+              <a:rPr lang="en-US" dirty="0"/>
+              <a:t> </a:t>
+            </a:r>
+            <a:r>
+              <a:rPr lang="en-US" dirty="0" err="1"/>
+              <a:t>Objekte</a:t>
+            </a:r>
+            <a:endParaRPr lang="en-US" dirty="0"/>
+          </a:p>
+          <a:p>
+            <a:r>
+              <a:rPr lang="de-DE" dirty="0"/>
+              <a:t>Neue Objekte werden mit dem </a:t>
+            </a:r>
+            <a:r>
+              <a:rPr lang="de-DE" dirty="0">
+                <a:latin typeface="Consolas" panose="020B0609020204030204" pitchFamily="49" charset="0"/>
+              </a:rPr>
+              <a:t>new </a:t>
+            </a:r>
+            <a:r>
+              <a:rPr lang="de-DE" dirty="0"/>
+              <a:t>Operator erzeugt</a:t>
+            </a:r>
+          </a:p>
+          <a:p>
+            <a:r>
+              <a:rPr lang="de-DE" dirty="0"/>
+              <a:t>Dabei wird ein Konstruktor der Klasse aufgerufen.</a:t>
+            </a:r>
+          </a:p>
+          <a:p>
+            <a:endParaRPr lang="de-DE" dirty="0"/>
+          </a:p>
           <a:p>
             <a:pPr marL="0" indent="0">
               <a:buNone/>
             </a:pPr>
             <a:r>
+              <a:rPr lang="en-US" dirty="0" err="1">
+                <a:latin typeface="Consolas" panose="020B0609020204030204" pitchFamily="49" charset="0"/>
+              </a:rPr>
+              <a:t>Klasse</a:t>
+            </a:r>
+            <a:r>
               <a:rPr lang="en-US" dirty="0">
                 <a:latin typeface="Consolas" panose="020B0609020204030204" pitchFamily="49" charset="0"/>
               </a:rPr>
-              <a:t>for (</a:t>
+              <a:t> </a:t>
             </a:r>
             <a:r>
               <a:rPr lang="en-US" dirty="0" err="1">
                 <a:latin typeface="Consolas" panose="020B0609020204030204" pitchFamily="49" charset="0"/>
               </a:rPr>
-              <a:t>Typ</a:t>
+              <a:t>variablenName</a:t>
             </a:r>
             <a:r>
               <a:rPr lang="en-US" dirty="0">
                 <a:latin typeface="Consolas" panose="020B0609020204030204" pitchFamily="49" charset="0"/>
               </a:rPr>
-              <a:t> </a:t>
+              <a:t> = new </a:t>
             </a:r>
             <a:r>
               <a:rPr lang="en-US" dirty="0" err="1">
                 <a:latin typeface="Consolas" panose="020B0609020204030204" pitchFamily="49" charset="0"/>
               </a:rPr>
-              <a:t>variablenName</a:t>
+              <a:t>Klasse</a:t>
             </a:r>
             <a:r>
               <a:rPr lang="en-US" dirty="0">
                 <a:latin typeface="Consolas" panose="020B0609020204030204" pitchFamily="49" charset="0"/>
               </a:rPr>
-              <a:t> : </a:t>
-            </a:r>
-            <a:r>
-              <a:rPr lang="en-US" dirty="0" err="1">
-                <a:latin typeface="Consolas" panose="020B0609020204030204" pitchFamily="49" charset="0"/>
-              </a:rPr>
-              <a:t>arrayName</a:t>
-            </a:r>
-            <a:r>
-              <a:rPr lang="en-US" dirty="0">
-                <a:latin typeface="Consolas" panose="020B0609020204030204" pitchFamily="49" charset="0"/>
-              </a:rPr>
-              <a:t>) {</a:t>
+              <a:t>(parameter);</a:t>
             </a:r>
           </a:p>
           <a:p>
             <a:pPr marL="0" indent="0">
               <a:buNone/>
             </a:pPr>
-            <a:r>
-              <a:rPr lang="en-US" dirty="0">
-                <a:latin typeface="Consolas" panose="020B0609020204030204" pitchFamily="49" charset="0"/>
-              </a:rPr>
-              <a:t>// </a:t>
-            </a:r>
-            <a:r>
-              <a:rPr lang="en-US" dirty="0" err="1">
-                <a:latin typeface="Consolas" panose="020B0609020204030204" pitchFamily="49" charset="0"/>
-              </a:rPr>
-              <a:t>Hier</a:t>
-            </a:r>
-            <a:r>
-              <a:rPr lang="en-US" dirty="0">
-                <a:latin typeface="Consolas" panose="020B0609020204030204" pitchFamily="49" charset="0"/>
-              </a:rPr>
-              <a:t> </a:t>
-            </a:r>
-            <a:r>
-              <a:rPr lang="en-US" dirty="0" err="1">
-                <a:latin typeface="Consolas" panose="020B0609020204030204" pitchFamily="49" charset="0"/>
-              </a:rPr>
-              <a:t>Coden</a:t>
-            </a:r>
-            <a:endParaRPr lang="en-US" dirty="0">
-              <a:latin typeface="Consolas" panose="020B0609020204030204" pitchFamily="49" charset="0"/>
-            </a:endParaRPr>
-          </a:p>
-          <a:p>
-            <a:pPr marL="0" indent="0">
-              <a:buNone/>
-            </a:pPr>
-            <a:r>
-              <a:rPr lang="en-US" dirty="0">
-                <a:latin typeface="Consolas" panose="020B0609020204030204" pitchFamily="49" charset="0"/>
-              </a:rPr>
-              <a:t>}</a:t>
-            </a:r>
-          </a:p>
-          <a:p>
-            <a:pPr marL="0" indent="0">
-              <a:buNone/>
-            </a:pPr>
-            <a:endParaRPr lang="en-US" dirty="0">
-              <a:latin typeface="Consolas" panose="020B0609020204030204" pitchFamily="49" charset="0"/>
-            </a:endParaRPr>
-          </a:p>
-          <a:p>
-            <a:pPr marL="0" indent="0">
-              <a:buNone/>
-            </a:pPr>
-            <a:r>
-              <a:rPr lang="en-US">
-                <a:latin typeface="Consolas" panose="020B0609020204030204" pitchFamily="49" charset="0"/>
-              </a:rPr>
-              <a:t>-&gt; For-each </a:t>
-            </a:r>
-            <a:r>
-              <a:rPr lang="en-US" dirty="0" err="1">
-                <a:latin typeface="Consolas" panose="020B0609020204030204" pitchFamily="49" charset="0"/>
-              </a:rPr>
-              <a:t>Scleife</a:t>
-            </a:r>
-            <a:endParaRPr lang="de-DE" dirty="0">
-              <a:latin typeface="Consolas" panose="020B0609020204030204" pitchFamily="49" charset="0"/>
-            </a:endParaRPr>
+            <a:endParaRPr lang="de-DE" dirty="0"/>
+          </a:p>
+          <a:p>
+            <a:r>
+              <a:rPr lang="de-DE" dirty="0">
+                <a:solidFill>
+                  <a:srgbClr val="FF0000"/>
+                </a:solidFill>
+              </a:rPr>
+              <a:t>ACHTUNG! </a:t>
+            </a:r>
+            <a:r>
+              <a:rPr lang="de-DE" dirty="0"/>
+              <a:t>Variablen halten nicht das Objekt an sich, sondern lediglich eine Referenz.</a:t>
+            </a:r>
           </a:p>
         </p:txBody>
       </p:sp>
     </p:spTree>
     <p:extLst>
       <p:ext uri="{BB962C8B-B14F-4D97-AF65-F5344CB8AC3E}">
-        <p14:creationId xmlns:p14="http://schemas.microsoft.com/office/powerpoint/2010/main" val="2890058383"/>
+        <p14:creationId xmlns:p14="http://schemas.microsoft.com/office/powerpoint/2010/main" val="1693870883"/>
       </p:ext>
     </p:extLst>
   </p:cSld>
@@ -7518,7 +7519,7 @@
           <p:cNvPr id="2" name="Title 1">
             <a:extLst>
               <a:ext uri="{FF2B5EF4-FFF2-40B4-BE49-F238E27FC236}">
-                <a16:creationId xmlns:a16="http://schemas.microsoft.com/office/drawing/2014/main" id="{E28CA3CF-0879-4A8D-944C-5254DBF4A264}"/>
+                <a16:creationId xmlns:a16="http://schemas.microsoft.com/office/drawing/2014/main" id="{6B36B499-01D8-4E98-85FA-253FE4C4CCE5}"/>
               </a:ext>
             </a:extLst>
           </p:cNvPr>
@@ -7559,7 +7560,7 @@
           <p:cNvPr id="3" name="Content Placeholder 2">
             <a:extLst>
               <a:ext uri="{FF2B5EF4-FFF2-40B4-BE49-F238E27FC236}">
-                <a16:creationId xmlns:a16="http://schemas.microsoft.com/office/drawing/2014/main" id="{8F4A2B56-E563-4448-BD04-72ACFB91D95A}"/>
+                <a16:creationId xmlns:a16="http://schemas.microsoft.com/office/drawing/2014/main" id="{0AF3AC64-EC9C-4B48-8813-5E108F6F2E7F}"/>
               </a:ext>
             </a:extLst>
           </p:cNvPr>
@@ -7570,137 +7571,188 @@
             <p:ph idx="1"/>
           </p:nvPr>
         </p:nvSpPr>
-        <p:spPr/>
-        <p:txBody>
-          <a:bodyPr/>
-          <a:lstStyle/>
-          <a:p>
-            <a:r>
-              <a:rPr lang="en-US" dirty="0"/>
-              <a:t>Klassen </a:t>
-            </a:r>
-            <a:r>
-              <a:rPr lang="en-US" dirty="0" err="1"/>
-              <a:t>sind</a:t>
-            </a:r>
-            <a:r>
-              <a:rPr lang="en-US" dirty="0"/>
+        <p:spPr>
+          <a:xfrm>
+            <a:off x="838200" y="1825624"/>
+            <a:ext cx="10515600" cy="4667251"/>
+          </a:xfrm>
+        </p:spPr>
+        <p:txBody>
+          <a:bodyPr>
+            <a:normAutofit/>
+          </a:bodyPr>
+          <a:lstStyle/>
+          <a:p>
+            <a:pPr marL="0" indent="0">
+              <a:buNone/>
+            </a:pPr>
+            <a:r>
+              <a:rPr lang="en-US" sz="3200" dirty="0" err="1">
+                <a:latin typeface="Consolas" panose="020B0609020204030204" pitchFamily="49" charset="0"/>
+              </a:rPr>
+              <a:t>Klasse</a:t>
+            </a:r>
+            <a:r>
+              <a:rPr lang="en-US" sz="3200" dirty="0">
+                <a:latin typeface="Consolas" panose="020B0609020204030204" pitchFamily="49" charset="0"/>
+              </a:rPr>
               <a:t> </a:t>
             </a:r>
             <a:r>
-              <a:rPr lang="en-US" dirty="0" err="1"/>
-              <a:t>Baupläne</a:t>
-            </a:r>
-            <a:r>
-              <a:rPr lang="en-US" dirty="0"/>
+              <a:rPr lang="en-US" sz="3200" dirty="0" err="1">
+                <a:latin typeface="Consolas" panose="020B0609020204030204" pitchFamily="49" charset="0"/>
+              </a:rPr>
+              <a:t>variablenName</a:t>
+            </a:r>
+            <a:r>
+              <a:rPr lang="en-US" sz="3200" dirty="0">
+                <a:latin typeface="Consolas" panose="020B0609020204030204" pitchFamily="49" charset="0"/>
+              </a:rPr>
+              <a:t> = new </a:t>
+            </a:r>
+            <a:r>
+              <a:rPr lang="en-US" sz="3200" dirty="0" err="1">
+                <a:latin typeface="Consolas" panose="020B0609020204030204" pitchFamily="49" charset="0"/>
+              </a:rPr>
+              <a:t>Klasse</a:t>
+            </a:r>
+            <a:r>
+              <a:rPr lang="en-US" sz="3200" dirty="0">
+                <a:latin typeface="Consolas" panose="020B0609020204030204" pitchFamily="49" charset="0"/>
+              </a:rPr>
+              <a:t>(parameter);</a:t>
+            </a:r>
+          </a:p>
+          <a:p>
+            <a:pPr marL="0" indent="0" algn="ctr">
+              <a:buNone/>
+            </a:pPr>
+            <a:r>
+              <a:rPr lang="en-US" sz="3200" dirty="0">
+                <a:latin typeface="Consolas" panose="020B0609020204030204" pitchFamily="49" charset="0"/>
+              </a:rPr>
+              <a:t>------------------------------</a:t>
+            </a:r>
+          </a:p>
+          <a:p>
+            <a:pPr marL="0" indent="0">
+              <a:buNone/>
+            </a:pPr>
+            <a:r>
+              <a:rPr lang="en-US" sz="3200" dirty="0" err="1">
+                <a:latin typeface="Consolas" panose="020B0609020204030204" pitchFamily="49" charset="0"/>
+              </a:rPr>
+              <a:t>Klasse</a:t>
+            </a:r>
+            <a:r>
+              <a:rPr lang="en-US" sz="3200" dirty="0">
+                <a:latin typeface="Consolas" panose="020B0609020204030204" pitchFamily="49" charset="0"/>
+              </a:rPr>
               <a:t> </a:t>
             </a:r>
             <a:r>
-              <a:rPr lang="en-US" dirty="0" err="1"/>
-              <a:t>für</a:t>
-            </a:r>
-            <a:r>
-              <a:rPr lang="en-US" dirty="0"/>
+              <a:rPr lang="en-US" sz="3200" dirty="0" err="1">
+                <a:latin typeface="Consolas" panose="020B0609020204030204" pitchFamily="49" charset="0"/>
+              </a:rPr>
+              <a:t>variablenName</a:t>
+            </a:r>
+            <a:r>
+              <a:rPr lang="en-US" sz="3200" dirty="0">
+                <a:latin typeface="Consolas" panose="020B0609020204030204" pitchFamily="49" charset="0"/>
+              </a:rPr>
+              <a:t>; //</a:t>
+            </a:r>
+            <a:r>
+              <a:rPr lang="en-US" sz="3200" dirty="0" err="1">
+                <a:latin typeface="Consolas" panose="020B0609020204030204" pitchFamily="49" charset="0"/>
+              </a:rPr>
+              <a:t>Deklaration</a:t>
+            </a:r>
+            <a:r>
+              <a:rPr lang="en-US" sz="3200" dirty="0">
+                <a:latin typeface="Consolas" panose="020B0609020204030204" pitchFamily="49" charset="0"/>
+              </a:rPr>
               <a:t> </a:t>
             </a:r>
-            <a:r>
-              <a:rPr lang="en-US" dirty="0" err="1"/>
-              <a:t>Objekte</a:t>
-            </a:r>
-            <a:endParaRPr lang="en-US" dirty="0"/>
-          </a:p>
-          <a:p>
-            <a:r>
-              <a:rPr lang="de-DE" dirty="0"/>
-              <a:t>Neue Objekte werden mit dem </a:t>
-            </a:r>
-            <a:r>
-              <a:rPr lang="de-DE" dirty="0">
-                <a:latin typeface="Consolas" panose="020B0609020204030204" pitchFamily="49" charset="0"/>
-              </a:rPr>
-              <a:t>new </a:t>
-            </a:r>
-            <a:r>
-              <a:rPr lang="de-DE" dirty="0"/>
-              <a:t>Operator erzeugt</a:t>
-            </a:r>
-          </a:p>
-          <a:p>
-            <a:r>
-              <a:rPr lang="de-DE" dirty="0"/>
-              <a:t>Dabei wird ein Konstruktor der Klasse aufgerufen.</a:t>
-            </a:r>
-          </a:p>
-          <a:p>
-            <a:endParaRPr lang="de-DE" dirty="0"/>
           </a:p>
           <a:p>
             <a:pPr marL="0" indent="0">
               <a:buNone/>
             </a:pPr>
             <a:r>
-              <a:rPr lang="en-US" dirty="0" err="1">
+              <a:rPr lang="en-US" sz="3200" i="1" dirty="0"/>
+              <a:t>-&gt; </a:t>
+            </a:r>
+            <a:r>
+              <a:rPr lang="en-US" sz="3200" i="1" dirty="0" err="1"/>
+              <a:t>Welchen</a:t>
+            </a:r>
+            <a:r>
+              <a:rPr lang="en-US" sz="3200" i="1" dirty="0"/>
+              <a:t> wert hat </a:t>
+            </a:r>
+            <a:r>
+              <a:rPr lang="en-US" sz="3200" i="1" dirty="0" err="1">
+                <a:latin typeface="Consolas" panose="020B0609020204030204" pitchFamily="49" charset="0"/>
+              </a:rPr>
+              <a:t>variablenName</a:t>
+            </a:r>
+            <a:r>
+              <a:rPr lang="en-US" sz="3200" i="1" dirty="0"/>
+              <a:t> </a:t>
+            </a:r>
+            <a:r>
+              <a:rPr lang="en-US" sz="3200" i="1" dirty="0" err="1"/>
+              <a:t>hier</a:t>
+            </a:r>
+            <a:r>
+              <a:rPr lang="en-US" sz="3200" i="1" dirty="0"/>
+              <a:t>?</a:t>
+            </a:r>
+          </a:p>
+          <a:p>
+            <a:pPr marL="0" indent="0">
+              <a:buNone/>
+            </a:pPr>
+            <a:r>
+              <a:rPr lang="en-US" sz="3200" dirty="0" err="1">
+                <a:latin typeface="Consolas" panose="020B0609020204030204" pitchFamily="49" charset="0"/>
+              </a:rPr>
+              <a:t>variablenName</a:t>
+            </a:r>
+            <a:r>
+              <a:rPr lang="en-US" sz="3200" dirty="0">
+                <a:latin typeface="Consolas" panose="020B0609020204030204" pitchFamily="49" charset="0"/>
+              </a:rPr>
+              <a:t> = new </a:t>
+            </a:r>
+            <a:r>
+              <a:rPr lang="en-US" sz="3200" dirty="0" err="1">
                 <a:latin typeface="Consolas" panose="020B0609020204030204" pitchFamily="49" charset="0"/>
               </a:rPr>
               <a:t>Klasse</a:t>
             </a:r>
             <a:r>
-              <a:rPr lang="en-US" dirty="0">
-                <a:latin typeface="Consolas" panose="020B0609020204030204" pitchFamily="49" charset="0"/>
-              </a:rPr>
-              <a:t> </a:t>
-            </a:r>
-            <a:r>
-              <a:rPr lang="en-US" dirty="0" err="1">
-                <a:latin typeface="Consolas" panose="020B0609020204030204" pitchFamily="49" charset="0"/>
-              </a:rPr>
-              <a:t>variablenName</a:t>
-            </a:r>
-            <a:r>
-              <a:rPr lang="en-US" dirty="0">
-                <a:latin typeface="Consolas" panose="020B0609020204030204" pitchFamily="49" charset="0"/>
-              </a:rPr>
-              <a:t> = new </a:t>
-            </a:r>
-            <a:r>
-              <a:rPr lang="en-US" dirty="0" err="1">
-                <a:latin typeface="Consolas" panose="020B0609020204030204" pitchFamily="49" charset="0"/>
-              </a:rPr>
-              <a:t>Klasse</a:t>
-            </a:r>
-            <a:r>
-              <a:rPr lang="en-US" dirty="0">
-                <a:latin typeface="Consolas" panose="020B0609020204030204" pitchFamily="49" charset="0"/>
-              </a:rPr>
-              <a:t>(parameter);</a:t>
+              <a:rPr lang="en-US" sz="3200" dirty="0">
+                <a:latin typeface="Consolas" panose="020B0609020204030204" pitchFamily="49" charset="0"/>
+              </a:rPr>
+              <a:t>(parameter); //Init</a:t>
             </a:r>
           </a:p>
           <a:p>
             <a:pPr marL="0" indent="0">
               <a:buNone/>
             </a:pPr>
-            <a:endParaRPr lang="de-DE" dirty="0"/>
-          </a:p>
-          <a:p>
-            <a:r>
-              <a:rPr lang="de-DE" dirty="0">
-                <a:solidFill>
-                  <a:srgbClr val="FF0000"/>
-                </a:solidFill>
-              </a:rPr>
-              <a:t>ACHTUNG! </a:t>
-            </a:r>
-            <a:r>
-              <a:rPr lang="de-DE" dirty="0"/>
-              <a:t>Variablen halten nicht das Objekt an sich, sondern lediglich eine Referenz.</a:t>
-            </a:r>
+            <a:endParaRPr lang="de-DE" sz="3200" dirty="0">
+              <a:latin typeface="Consolas" panose="020B0609020204030204" pitchFamily="49" charset="0"/>
+            </a:endParaRPr>
           </a:p>
         </p:txBody>
       </p:sp>
     </p:spTree>
     <p:extLst>
       <p:ext uri="{BB962C8B-B14F-4D97-AF65-F5344CB8AC3E}">
-        <p14:creationId xmlns:p14="http://schemas.microsoft.com/office/powerpoint/2010/main" val="1693870883"/>
+        <p14:creationId xmlns:p14="http://schemas.microsoft.com/office/powerpoint/2010/main" val="248704395"/>
       </p:ext>
     </p:extLst>
   </p:cSld>

</xml_diff>